<commit_message>
added grant figure drafts, as well as plan for MS degree
</commit_message>
<xml_diff>
--- a/Aaron ideas and analyses/IGP grant figures.pptx
+++ b/Aaron ideas and analyses/IGP grant figures.pptx
@@ -6,8 +6,9 @@
   </p:sldMasterIdLst>
   <p:sldIdLst>
     <p:sldId id="258" r:id="rId2"/>
-    <p:sldId id="257" r:id="rId3"/>
-    <p:sldId id="259" r:id="rId4"/>
+    <p:sldId id="260" r:id="rId3"/>
+    <p:sldId id="257" r:id="rId4"/>
+    <p:sldId id="259" r:id="rId5"/>
   </p:sldIdLst>
   <p:sldSz cx="12192000" cy="6858000"/>
   <p:notesSz cx="6858000" cy="9144000"/>
@@ -114,6 +115,838 @@
 </p:presentation>
 </file>
 
+<file path=ppt/revisionInfo.xml><?xml version="1.0" encoding="utf-8"?>
+<p1510:revInfo xmlns:a="http://schemas.openxmlformats.org/drawingml/2006/main" xmlns:r="http://schemas.openxmlformats.org/officeDocument/2006/relationships" xmlns:p1510="http://schemas.microsoft.com/office/powerpoint/2015/10/main">
+  <p1510:revLst>
+    <p1510:client id="{C11DABC9-BF3D-4A70-A810-46CDD4C489DE}" v="38" dt="2023-11-16T22:06:41.581"/>
+  </p1510:revLst>
+</p1510:revInfo>
+</file>
+
+<file path=ppt/changesInfos/changesInfo1.xml><?xml version="1.0" encoding="utf-8"?>
+<pc:chgInfo xmlns:a="http://schemas.openxmlformats.org/drawingml/2006/main" xmlns:r="http://schemas.openxmlformats.org/officeDocument/2006/relationships" xmlns:ac="http://schemas.microsoft.com/office/drawing/2013/main/command" xmlns:pc="http://schemas.microsoft.com/office/powerpoint/2013/main/command">
+  <pc:docChgLst>
+    <pc:chgData name="Aaron Tayal" userId="32f02f1096a9313f" providerId="LiveId" clId="{C11DABC9-BF3D-4A70-A810-46CDD4C489DE}"/>
+    <pc:docChg chg="undo custSel mod addSld modSld">
+      <pc:chgData name="Aaron Tayal" userId="32f02f1096a9313f" providerId="LiveId" clId="{C11DABC9-BF3D-4A70-A810-46CDD4C489DE}" dt="2023-11-16T22:09:37.594" v="482" actId="1076"/>
+      <pc:docMkLst>
+        <pc:docMk/>
+      </pc:docMkLst>
+      <pc:sldChg chg="modSp mod">
+        <pc:chgData name="Aaron Tayal" userId="32f02f1096a9313f" providerId="LiveId" clId="{C11DABC9-BF3D-4A70-A810-46CDD4C489DE}" dt="2023-11-10T19:09:59.795" v="173" actId="1037"/>
+        <pc:sldMkLst>
+          <pc:docMk/>
+          <pc:sldMk cId="2307956216" sldId="258"/>
+        </pc:sldMkLst>
+        <pc:picChg chg="mod">
+          <ac:chgData name="Aaron Tayal" userId="32f02f1096a9313f" providerId="LiveId" clId="{C11DABC9-BF3D-4A70-A810-46CDD4C489DE}" dt="2023-11-10T19:09:59.795" v="173" actId="1037"/>
+          <ac:picMkLst>
+            <pc:docMk/>
+            <pc:sldMk cId="2307956216" sldId="258"/>
+            <ac:picMk id="5" creationId="{A00BE459-C7B9-B2F3-9878-CF405B853DE5}"/>
+          </ac:picMkLst>
+        </pc:picChg>
+      </pc:sldChg>
+      <pc:sldChg chg="addSp delSp modSp new mod">
+        <pc:chgData name="Aaron Tayal" userId="32f02f1096a9313f" providerId="LiveId" clId="{C11DABC9-BF3D-4A70-A810-46CDD4C489DE}" dt="2023-11-16T22:09:37.594" v="482" actId="1076"/>
+        <pc:sldMkLst>
+          <pc:docMk/>
+          <pc:sldMk cId="2356962618" sldId="260"/>
+        </pc:sldMkLst>
+        <pc:spChg chg="del">
+          <ac:chgData name="Aaron Tayal" userId="32f02f1096a9313f" providerId="LiveId" clId="{C11DABC9-BF3D-4A70-A810-46CDD4C489DE}" dt="2023-11-16T21:29:53.348" v="176" actId="478"/>
+          <ac:spMkLst>
+            <pc:docMk/>
+            <pc:sldMk cId="2356962618" sldId="260"/>
+            <ac:spMk id="2" creationId="{21CEFEBF-A0B3-1A65-D000-945B222DD2F1}"/>
+          </ac:spMkLst>
+        </pc:spChg>
+        <pc:spChg chg="del">
+          <ac:chgData name="Aaron Tayal" userId="32f02f1096a9313f" providerId="LiveId" clId="{C11DABC9-BF3D-4A70-A810-46CDD4C489DE}" dt="2023-11-16T21:29:54.414" v="177" actId="478"/>
+          <ac:spMkLst>
+            <pc:docMk/>
+            <pc:sldMk cId="2356962618" sldId="260"/>
+            <ac:spMk id="3" creationId="{48D4E51C-8CFD-B909-7BE2-5540C38D0885}"/>
+          </ac:spMkLst>
+        </pc:spChg>
+        <pc:spChg chg="add mod">
+          <ac:chgData name="Aaron Tayal" userId="32f02f1096a9313f" providerId="LiveId" clId="{C11DABC9-BF3D-4A70-A810-46CDD4C489DE}" dt="2023-11-16T22:04:22.040" v="423" actId="20577"/>
+          <ac:spMkLst>
+            <pc:docMk/>
+            <pc:sldMk cId="2356962618" sldId="260"/>
+            <ac:spMk id="8" creationId="{EB762454-4A19-92AB-5DA1-1E4956BA4E69}"/>
+          </ac:spMkLst>
+        </pc:spChg>
+        <pc:spChg chg="add mod">
+          <ac:chgData name="Aaron Tayal" userId="32f02f1096a9313f" providerId="LiveId" clId="{C11DABC9-BF3D-4A70-A810-46CDD4C489DE}" dt="2023-11-16T22:08:47.604" v="466" actId="20577"/>
+          <ac:spMkLst>
+            <pc:docMk/>
+            <pc:sldMk cId="2356962618" sldId="260"/>
+            <ac:spMk id="13" creationId="{9048FAB7-97D3-77C9-4906-47340E7F4577}"/>
+          </ac:spMkLst>
+        </pc:spChg>
+        <pc:spChg chg="add mod">
+          <ac:chgData name="Aaron Tayal" userId="32f02f1096a9313f" providerId="LiveId" clId="{C11DABC9-BF3D-4A70-A810-46CDD4C489DE}" dt="2023-11-16T22:08:50.610" v="468" actId="20577"/>
+          <ac:spMkLst>
+            <pc:docMk/>
+            <pc:sldMk cId="2356962618" sldId="260"/>
+            <ac:spMk id="30" creationId="{F8BE0526-17CC-1CC6-6FCE-FB1E72EBF6C4}"/>
+          </ac:spMkLst>
+        </pc:spChg>
+        <pc:spChg chg="add mod">
+          <ac:chgData name="Aaron Tayal" userId="32f02f1096a9313f" providerId="LiveId" clId="{C11DABC9-BF3D-4A70-A810-46CDD4C489DE}" dt="2023-11-16T22:08:53.226" v="470" actId="20577"/>
+          <ac:spMkLst>
+            <pc:docMk/>
+            <pc:sldMk cId="2356962618" sldId="260"/>
+            <ac:spMk id="35" creationId="{F851F3F3-0B0A-CF83-5880-235977439D9E}"/>
+          </ac:spMkLst>
+        </pc:spChg>
+        <pc:spChg chg="add mod">
+          <ac:chgData name="Aaron Tayal" userId="32f02f1096a9313f" providerId="LiveId" clId="{C11DABC9-BF3D-4A70-A810-46CDD4C489DE}" dt="2023-11-16T22:09:14.173" v="474" actId="20577"/>
+          <ac:spMkLst>
+            <pc:docMk/>
+            <pc:sldMk cId="2356962618" sldId="260"/>
+            <ac:spMk id="60" creationId="{8A66EA2F-B262-5280-EF2F-DFF0150C4062}"/>
+          </ac:spMkLst>
+        </pc:spChg>
+        <pc:spChg chg="add mod">
+          <ac:chgData name="Aaron Tayal" userId="32f02f1096a9313f" providerId="LiveId" clId="{C11DABC9-BF3D-4A70-A810-46CDD4C489DE}" dt="2023-11-16T22:09:08.970" v="472" actId="20577"/>
+          <ac:spMkLst>
+            <pc:docMk/>
+            <pc:sldMk cId="2356962618" sldId="260"/>
+            <ac:spMk id="70" creationId="{D9047455-0F0F-1285-8C26-5278FA6BDD36}"/>
+          </ac:spMkLst>
+        </pc:spChg>
+        <pc:spChg chg="add mod">
+          <ac:chgData name="Aaron Tayal" userId="32f02f1096a9313f" providerId="LiveId" clId="{C11DABC9-BF3D-4A70-A810-46CDD4C489DE}" dt="2023-11-16T22:09:27.463" v="480" actId="20577"/>
+          <ac:spMkLst>
+            <pc:docMk/>
+            <pc:sldMk cId="2356962618" sldId="260"/>
+            <ac:spMk id="71" creationId="{4380F16A-A1EC-AD7A-501A-5D771D7A5CA0}"/>
+          </ac:spMkLst>
+        </pc:spChg>
+        <pc:spChg chg="add mod">
+          <ac:chgData name="Aaron Tayal" userId="32f02f1096a9313f" providerId="LiveId" clId="{C11DABC9-BF3D-4A70-A810-46CDD4C489DE}" dt="2023-11-16T22:09:33.900" v="481" actId="1076"/>
+          <ac:spMkLst>
+            <pc:docMk/>
+            <pc:sldMk cId="2356962618" sldId="260"/>
+            <ac:spMk id="78" creationId="{5C6AC23F-9679-F6BF-B4E2-3C5093DBCA1D}"/>
+          </ac:spMkLst>
+        </pc:spChg>
+        <pc:spChg chg="add mod">
+          <ac:chgData name="Aaron Tayal" userId="32f02f1096a9313f" providerId="LiveId" clId="{C11DABC9-BF3D-4A70-A810-46CDD4C489DE}" dt="2023-11-16T22:09:37.594" v="482" actId="1076"/>
+          <ac:spMkLst>
+            <pc:docMk/>
+            <pc:sldMk cId="2356962618" sldId="260"/>
+            <ac:spMk id="79" creationId="{C5237BC1-9C0A-962A-D2F5-2D9A484C08FD}"/>
+          </ac:spMkLst>
+        </pc:spChg>
+        <pc:spChg chg="add mod">
+          <ac:chgData name="Aaron Tayal" userId="32f02f1096a9313f" providerId="LiveId" clId="{C11DABC9-BF3D-4A70-A810-46CDD4C489DE}" dt="2023-11-16T22:08:26.161" v="461" actId="20577"/>
+          <ac:spMkLst>
+            <pc:docMk/>
+            <pc:sldMk cId="2356962618" sldId="260"/>
+            <ac:spMk id="89" creationId="{DB7ADC92-FA49-279F-4195-6688EBD39636}"/>
+          </ac:spMkLst>
+        </pc:spChg>
+        <pc:spChg chg="add mod">
+          <ac:chgData name="Aaron Tayal" userId="32f02f1096a9313f" providerId="LiveId" clId="{C11DABC9-BF3D-4A70-A810-46CDD4C489DE}" dt="2023-11-16T22:08:34.410" v="464" actId="1076"/>
+          <ac:spMkLst>
+            <pc:docMk/>
+            <pc:sldMk cId="2356962618" sldId="260"/>
+            <ac:spMk id="101" creationId="{6C300178-5A8A-BF62-3FB8-DC60913A29B3}"/>
+          </ac:spMkLst>
+        </pc:spChg>
+        <pc:spChg chg="add mod">
+          <ac:chgData name="Aaron Tayal" userId="32f02f1096a9313f" providerId="LiveId" clId="{C11DABC9-BF3D-4A70-A810-46CDD4C489DE}" dt="2023-11-16T22:07:29.838" v="448" actId="1076"/>
+          <ac:spMkLst>
+            <pc:docMk/>
+            <pc:sldMk cId="2356962618" sldId="260"/>
+            <ac:spMk id="111" creationId="{13006986-5CB5-B4A9-D123-340D211246A6}"/>
+          </ac:spMkLst>
+        </pc:spChg>
+        <pc:grpChg chg="del mod">
+          <ac:chgData name="Aaron Tayal" userId="32f02f1096a9313f" providerId="LiveId" clId="{C11DABC9-BF3D-4A70-A810-46CDD4C489DE}" dt="2023-11-16T21:40:35.965" v="255"/>
+          <ac:grpSpMkLst>
+            <pc:docMk/>
+            <pc:sldMk cId="2356962618" sldId="260"/>
+            <ac:grpSpMk id="41" creationId="{8E8034EF-2B4B-24FC-0D20-6AFB62E357E1}"/>
+          </ac:grpSpMkLst>
+        </pc:grpChg>
+        <pc:grpChg chg="del mod">
+          <ac:chgData name="Aaron Tayal" userId="32f02f1096a9313f" providerId="LiveId" clId="{C11DABC9-BF3D-4A70-A810-46CDD4C489DE}" dt="2023-11-16T21:40:38.878" v="257"/>
+          <ac:grpSpMkLst>
+            <pc:docMk/>
+            <pc:sldMk cId="2356962618" sldId="260"/>
+            <ac:grpSpMk id="44" creationId="{80DF8190-2A53-1D46-851B-1611BB89870B}"/>
+          </ac:grpSpMkLst>
+        </pc:grpChg>
+        <pc:grpChg chg="mod">
+          <ac:chgData name="Aaron Tayal" userId="32f02f1096a9313f" providerId="LiveId" clId="{C11DABC9-BF3D-4A70-A810-46CDD4C489DE}" dt="2023-11-16T21:40:38.878" v="257"/>
+          <ac:grpSpMkLst>
+            <pc:docMk/>
+            <pc:sldMk cId="2356962618" sldId="260"/>
+            <ac:grpSpMk id="46" creationId="{A84DE551-BDF5-D3C5-EEFA-20DCB209A055}"/>
+          </ac:grpSpMkLst>
+        </pc:grpChg>
+        <pc:grpChg chg="del mod">
+          <ac:chgData name="Aaron Tayal" userId="32f02f1096a9313f" providerId="LiveId" clId="{C11DABC9-BF3D-4A70-A810-46CDD4C489DE}" dt="2023-11-16T21:40:55.008" v="265"/>
+          <ac:grpSpMkLst>
+            <pc:docMk/>
+            <pc:sldMk cId="2356962618" sldId="260"/>
+            <ac:grpSpMk id="50" creationId="{74782DB4-714C-14C9-3012-09D686619F60}"/>
+          </ac:grpSpMkLst>
+        </pc:grpChg>
+        <pc:grpChg chg="del mod">
+          <ac:chgData name="Aaron Tayal" userId="32f02f1096a9313f" providerId="LiveId" clId="{C11DABC9-BF3D-4A70-A810-46CDD4C489DE}" dt="2023-11-16T21:40:57.309" v="267"/>
+          <ac:grpSpMkLst>
+            <pc:docMk/>
+            <pc:sldMk cId="2356962618" sldId="260"/>
+            <ac:grpSpMk id="53" creationId="{61AA621B-E0CA-5A90-45FD-4BD31A635B70}"/>
+          </ac:grpSpMkLst>
+        </pc:grpChg>
+        <pc:grpChg chg="mod">
+          <ac:chgData name="Aaron Tayal" userId="32f02f1096a9313f" providerId="LiveId" clId="{C11DABC9-BF3D-4A70-A810-46CDD4C489DE}" dt="2023-11-16T21:40:57.309" v="267"/>
+          <ac:grpSpMkLst>
+            <pc:docMk/>
+            <pc:sldMk cId="2356962618" sldId="260"/>
+            <ac:grpSpMk id="55" creationId="{616EDDBF-893A-F5D4-672F-03BB2EA8E159}"/>
+          </ac:grpSpMkLst>
+        </pc:grpChg>
+        <pc:picChg chg="add mod">
+          <ac:chgData name="Aaron Tayal" userId="32f02f1096a9313f" providerId="LiveId" clId="{C11DABC9-BF3D-4A70-A810-46CDD4C489DE}" dt="2023-11-16T21:47:47.728" v="308" actId="1076"/>
+          <ac:picMkLst>
+            <pc:docMk/>
+            <pc:sldMk cId="2356962618" sldId="260"/>
+            <ac:picMk id="4" creationId="{DEA815E6-529D-7045-5D5B-F93B0CF64E17}"/>
+          </ac:picMkLst>
+        </pc:picChg>
+        <pc:inkChg chg="add del">
+          <ac:chgData name="Aaron Tayal" userId="32f02f1096a9313f" providerId="LiveId" clId="{C11DABC9-BF3D-4A70-A810-46CDD4C489DE}" dt="2023-11-16T21:39:05.531" v="242" actId="9405"/>
+          <ac:inkMkLst>
+            <pc:docMk/>
+            <pc:sldMk cId="2356962618" sldId="260"/>
+            <ac:inkMk id="36" creationId="{C7A10491-E3E2-C390-C07C-B7CA3FE65A13}"/>
+          </ac:inkMkLst>
+        </pc:inkChg>
+        <pc:inkChg chg="add del mod">
+          <ac:chgData name="Aaron Tayal" userId="32f02f1096a9313f" providerId="LiveId" clId="{C11DABC9-BF3D-4A70-A810-46CDD4C489DE}" dt="2023-11-16T22:04:52.523" v="428" actId="21"/>
+          <ac:inkMkLst>
+            <pc:docMk/>
+            <pc:sldMk cId="2356962618" sldId="260"/>
+            <ac:inkMk id="37" creationId="{9ABB5D28-C5F6-F350-823D-02C8921F2B4B}"/>
+          </ac:inkMkLst>
+        </pc:inkChg>
+        <pc:inkChg chg="add mod">
+          <ac:chgData name="Aaron Tayal" userId="32f02f1096a9313f" providerId="LiveId" clId="{C11DABC9-BF3D-4A70-A810-46CDD4C489DE}" dt="2023-11-16T21:40:38.878" v="257"/>
+          <ac:inkMkLst>
+            <pc:docMk/>
+            <pc:sldMk cId="2356962618" sldId="260"/>
+            <ac:inkMk id="38" creationId="{7243E7C3-BCF1-0950-3E01-862EC79A4C63}"/>
+          </ac:inkMkLst>
+        </pc:inkChg>
+        <pc:inkChg chg="add mod">
+          <ac:chgData name="Aaron Tayal" userId="32f02f1096a9313f" providerId="LiveId" clId="{C11DABC9-BF3D-4A70-A810-46CDD4C489DE}" dt="2023-11-16T21:40:38.878" v="257"/>
+          <ac:inkMkLst>
+            <pc:docMk/>
+            <pc:sldMk cId="2356962618" sldId="260"/>
+            <ac:inkMk id="39" creationId="{43D29B1C-14B6-21C4-DF04-14E7AAB0063F}"/>
+          </ac:inkMkLst>
+        </pc:inkChg>
+        <pc:inkChg chg="add mod">
+          <ac:chgData name="Aaron Tayal" userId="32f02f1096a9313f" providerId="LiveId" clId="{C11DABC9-BF3D-4A70-A810-46CDD4C489DE}" dt="2023-11-16T21:40:38.878" v="257"/>
+          <ac:inkMkLst>
+            <pc:docMk/>
+            <pc:sldMk cId="2356962618" sldId="260"/>
+            <ac:inkMk id="40" creationId="{7788848C-EFC8-13BB-7779-978E6CD369C3}"/>
+          </ac:inkMkLst>
+        </pc:inkChg>
+        <pc:inkChg chg="add mod">
+          <ac:chgData name="Aaron Tayal" userId="32f02f1096a9313f" providerId="LiveId" clId="{C11DABC9-BF3D-4A70-A810-46CDD4C489DE}" dt="2023-11-16T21:40:38.878" v="257"/>
+          <ac:inkMkLst>
+            <pc:docMk/>
+            <pc:sldMk cId="2356962618" sldId="260"/>
+            <ac:inkMk id="42" creationId="{BE449B54-356C-E1C5-CE89-33E197FD8790}"/>
+          </ac:inkMkLst>
+        </pc:inkChg>
+        <pc:inkChg chg="add mod">
+          <ac:chgData name="Aaron Tayal" userId="32f02f1096a9313f" providerId="LiveId" clId="{C11DABC9-BF3D-4A70-A810-46CDD4C489DE}" dt="2023-11-16T21:40:38.878" v="257"/>
+          <ac:inkMkLst>
+            <pc:docMk/>
+            <pc:sldMk cId="2356962618" sldId="260"/>
+            <ac:inkMk id="43" creationId="{A973C8BF-DA4A-9985-FFCF-9C00048B7B20}"/>
+          </ac:inkMkLst>
+        </pc:inkChg>
+        <pc:inkChg chg="add mod">
+          <ac:chgData name="Aaron Tayal" userId="32f02f1096a9313f" providerId="LiveId" clId="{C11DABC9-BF3D-4A70-A810-46CDD4C489DE}" dt="2023-11-16T21:40:38.878" v="257"/>
+          <ac:inkMkLst>
+            <pc:docMk/>
+            <pc:sldMk cId="2356962618" sldId="260"/>
+            <ac:inkMk id="45" creationId="{75FA5228-55A5-CAC4-A45B-D3DC90EA5B97}"/>
+          </ac:inkMkLst>
+        </pc:inkChg>
+        <pc:inkChg chg="add del">
+          <ac:chgData name="Aaron Tayal" userId="32f02f1096a9313f" providerId="LiveId" clId="{C11DABC9-BF3D-4A70-A810-46CDD4C489DE}" dt="2023-11-16T21:40:43.677" v="259" actId="9405"/>
+          <ac:inkMkLst>
+            <pc:docMk/>
+            <pc:sldMk cId="2356962618" sldId="260"/>
+            <ac:inkMk id="47" creationId="{67FB7D51-B057-7B88-1CF9-74503EF4A778}"/>
+          </ac:inkMkLst>
+        </pc:inkChg>
+        <pc:inkChg chg="add mod">
+          <ac:chgData name="Aaron Tayal" userId="32f02f1096a9313f" providerId="LiveId" clId="{C11DABC9-BF3D-4A70-A810-46CDD4C489DE}" dt="2023-11-16T21:40:57.309" v="267"/>
+          <ac:inkMkLst>
+            <pc:docMk/>
+            <pc:sldMk cId="2356962618" sldId="260"/>
+            <ac:inkMk id="48" creationId="{133D17C6-08D1-64A0-0180-8E2C35AA5F14}"/>
+          </ac:inkMkLst>
+        </pc:inkChg>
+        <pc:inkChg chg="add mod">
+          <ac:chgData name="Aaron Tayal" userId="32f02f1096a9313f" providerId="LiveId" clId="{C11DABC9-BF3D-4A70-A810-46CDD4C489DE}" dt="2023-11-16T21:40:57.309" v="267"/>
+          <ac:inkMkLst>
+            <pc:docMk/>
+            <pc:sldMk cId="2356962618" sldId="260"/>
+            <ac:inkMk id="49" creationId="{C270BC0F-8FA1-CDB5-F40F-3F4A40CBEFA7}"/>
+          </ac:inkMkLst>
+        </pc:inkChg>
+        <pc:inkChg chg="add mod">
+          <ac:chgData name="Aaron Tayal" userId="32f02f1096a9313f" providerId="LiveId" clId="{C11DABC9-BF3D-4A70-A810-46CDD4C489DE}" dt="2023-11-16T21:40:57.309" v="267"/>
+          <ac:inkMkLst>
+            <pc:docMk/>
+            <pc:sldMk cId="2356962618" sldId="260"/>
+            <ac:inkMk id="51" creationId="{408DA0BD-7158-9883-9E57-75582DE0DD00}"/>
+          </ac:inkMkLst>
+        </pc:inkChg>
+        <pc:inkChg chg="add mod">
+          <ac:chgData name="Aaron Tayal" userId="32f02f1096a9313f" providerId="LiveId" clId="{C11DABC9-BF3D-4A70-A810-46CDD4C489DE}" dt="2023-11-16T21:40:57.309" v="267"/>
+          <ac:inkMkLst>
+            <pc:docMk/>
+            <pc:sldMk cId="2356962618" sldId="260"/>
+            <ac:inkMk id="52" creationId="{3DD7DD95-B61A-08F5-61D8-56F0D6109DF1}"/>
+          </ac:inkMkLst>
+        </pc:inkChg>
+        <pc:inkChg chg="add mod">
+          <ac:chgData name="Aaron Tayal" userId="32f02f1096a9313f" providerId="LiveId" clId="{C11DABC9-BF3D-4A70-A810-46CDD4C489DE}" dt="2023-11-16T21:40:57.309" v="267"/>
+          <ac:inkMkLst>
+            <pc:docMk/>
+            <pc:sldMk cId="2356962618" sldId="260"/>
+            <ac:inkMk id="54" creationId="{87D235CA-57DB-44BC-C38C-ED8CEA08BBF8}"/>
+          </ac:inkMkLst>
+        </pc:inkChg>
+        <pc:inkChg chg="add">
+          <ac:chgData name="Aaron Tayal" userId="32f02f1096a9313f" providerId="LiveId" clId="{C11DABC9-BF3D-4A70-A810-46CDD4C489DE}" dt="2023-11-16T21:41:01.180" v="268" actId="9405"/>
+          <ac:inkMkLst>
+            <pc:docMk/>
+            <pc:sldMk cId="2356962618" sldId="260"/>
+            <ac:inkMk id="56" creationId="{6A62ADA0-36CF-9108-8CD3-AD33A147967F}"/>
+          </ac:inkMkLst>
+        </pc:inkChg>
+        <pc:inkChg chg="add del mod">
+          <ac:chgData name="Aaron Tayal" userId="32f02f1096a9313f" providerId="LiveId" clId="{C11DABC9-BF3D-4A70-A810-46CDD4C489DE}" dt="2023-11-16T22:05:00.111" v="432" actId="478"/>
+          <ac:inkMkLst>
+            <pc:docMk/>
+            <pc:sldMk cId="2356962618" sldId="260"/>
+            <ac:inkMk id="106" creationId="{A1BA7D02-5C63-A62B-C546-24B0CEF2C236}"/>
+          </ac:inkMkLst>
+        </pc:inkChg>
+        <pc:inkChg chg="add mod">
+          <ac:chgData name="Aaron Tayal" userId="32f02f1096a9313f" providerId="LiveId" clId="{C11DABC9-BF3D-4A70-A810-46CDD4C489DE}" dt="2023-11-16T22:05:28.084" v="434" actId="208"/>
+          <ac:inkMkLst>
+            <pc:docMk/>
+            <pc:sldMk cId="2356962618" sldId="260"/>
+            <ac:inkMk id="107" creationId="{58B94F94-871B-0977-F75D-539542513FA8}"/>
+          </ac:inkMkLst>
+        </pc:inkChg>
+        <pc:cxnChg chg="add del mod">
+          <ac:chgData name="Aaron Tayal" userId="32f02f1096a9313f" providerId="LiveId" clId="{C11DABC9-BF3D-4A70-A810-46CDD4C489DE}" dt="2023-11-16T21:40:08.336" v="248" actId="478"/>
+          <ac:cxnSpMkLst>
+            <pc:docMk/>
+            <pc:sldMk cId="2356962618" sldId="260"/>
+            <ac:cxnSpMk id="5" creationId="{414C9D72-8B4C-6824-32CA-2E4215118588}"/>
+          </ac:cxnSpMkLst>
+        </pc:cxnChg>
+        <pc:cxnChg chg="add mod">
+          <ac:chgData name="Aaron Tayal" userId="32f02f1096a9313f" providerId="LiveId" clId="{C11DABC9-BF3D-4A70-A810-46CDD4C489DE}" dt="2023-11-16T22:00:52.950" v="409" actId="208"/>
+          <ac:cxnSpMkLst>
+            <pc:docMk/>
+            <pc:sldMk cId="2356962618" sldId="260"/>
+            <ac:cxnSpMk id="9" creationId="{656E75F0-39DB-C8CA-1328-65B3DF9B9A0D}"/>
+          </ac:cxnSpMkLst>
+        </pc:cxnChg>
+        <pc:cxnChg chg="add mod">
+          <ac:chgData name="Aaron Tayal" userId="32f02f1096a9313f" providerId="LiveId" clId="{C11DABC9-BF3D-4A70-A810-46CDD4C489DE}" dt="2023-11-16T22:04:57.483" v="431" actId="1076"/>
+          <ac:cxnSpMkLst>
+            <pc:docMk/>
+            <pc:sldMk cId="2356962618" sldId="260"/>
+            <ac:cxnSpMk id="22" creationId="{F97DBC35-7175-CC95-595C-A8C6F48108FF}"/>
+          </ac:cxnSpMkLst>
+        </pc:cxnChg>
+        <pc:cxnChg chg="add del mod">
+          <ac:chgData name="Aaron Tayal" userId="32f02f1096a9313f" providerId="LiveId" clId="{C11DABC9-BF3D-4A70-A810-46CDD4C489DE}" dt="2023-11-16T21:39:27.079" v="244" actId="478"/>
+          <ac:cxnSpMkLst>
+            <pc:docMk/>
+            <pc:sldMk cId="2356962618" sldId="260"/>
+            <ac:cxnSpMk id="32" creationId="{7A2A7997-F5D7-472B-4922-2068E4702692}"/>
+          </ac:cxnSpMkLst>
+        </pc:cxnChg>
+        <pc:cxnChg chg="add mod">
+          <ac:chgData name="Aaron Tayal" userId="32f02f1096a9313f" providerId="LiveId" clId="{C11DABC9-BF3D-4A70-A810-46CDD4C489DE}" dt="2023-11-16T22:00:10.278" v="407" actId="208"/>
+          <ac:cxnSpMkLst>
+            <pc:docMk/>
+            <pc:sldMk cId="2356962618" sldId="260"/>
+            <ac:cxnSpMk id="57" creationId="{E9252809-AFD7-9F10-EDDA-D2BC9641EF78}"/>
+          </ac:cxnSpMkLst>
+        </pc:cxnChg>
+        <pc:cxnChg chg="add mod">
+          <ac:chgData name="Aaron Tayal" userId="32f02f1096a9313f" providerId="LiveId" clId="{C11DABC9-BF3D-4A70-A810-46CDD4C489DE}" dt="2023-11-16T21:45:42.734" v="294" actId="208"/>
+          <ac:cxnSpMkLst>
+            <pc:docMk/>
+            <pc:sldMk cId="2356962618" sldId="260"/>
+            <ac:cxnSpMk id="61" creationId="{BAA3A9A2-CC13-2F66-9795-1905130AA83E}"/>
+          </ac:cxnSpMkLst>
+        </pc:cxnChg>
+        <pc:cxnChg chg="add mod">
+          <ac:chgData name="Aaron Tayal" userId="32f02f1096a9313f" providerId="LiveId" clId="{C11DABC9-BF3D-4A70-A810-46CDD4C489DE}" dt="2023-11-16T22:02:52.904" v="419" actId="208"/>
+          <ac:cxnSpMkLst>
+            <pc:docMk/>
+            <pc:sldMk cId="2356962618" sldId="260"/>
+            <ac:cxnSpMk id="72" creationId="{645936BF-4107-9628-E820-13518BC505C4}"/>
+          </ac:cxnSpMkLst>
+        </pc:cxnChg>
+        <pc:cxnChg chg="add mod">
+          <ac:chgData name="Aaron Tayal" userId="32f02f1096a9313f" providerId="LiveId" clId="{C11DABC9-BF3D-4A70-A810-46CDD4C489DE}" dt="2023-11-16T21:56:44.456" v="386" actId="14100"/>
+          <ac:cxnSpMkLst>
+            <pc:docMk/>
+            <pc:sldMk cId="2356962618" sldId="260"/>
+            <ac:cxnSpMk id="80" creationId="{3DF12BE6-8BAE-3D4B-F047-F89F3457D69A}"/>
+          </ac:cxnSpMkLst>
+        </pc:cxnChg>
+        <pc:cxnChg chg="add mod">
+          <ac:chgData name="Aaron Tayal" userId="32f02f1096a9313f" providerId="LiveId" clId="{C11DABC9-BF3D-4A70-A810-46CDD4C489DE}" dt="2023-11-16T21:56:08.386" v="379" actId="208"/>
+          <ac:cxnSpMkLst>
+            <pc:docMk/>
+            <pc:sldMk cId="2356962618" sldId="260"/>
+            <ac:cxnSpMk id="83" creationId="{C2D09BB4-0B0F-96A1-74BB-5DE331078DA7}"/>
+          </ac:cxnSpMkLst>
+        </pc:cxnChg>
+        <pc:cxnChg chg="add mod">
+          <ac:chgData name="Aaron Tayal" userId="32f02f1096a9313f" providerId="LiveId" clId="{C11DABC9-BF3D-4A70-A810-46CDD4C489DE}" dt="2023-11-16T21:56:17.833" v="381" actId="208"/>
+          <ac:cxnSpMkLst>
+            <pc:docMk/>
+            <pc:sldMk cId="2356962618" sldId="260"/>
+            <ac:cxnSpMk id="86" creationId="{68EA6B0C-1EEF-A6A4-970D-0FCD87C5711E}"/>
+          </ac:cxnSpMkLst>
+        </pc:cxnChg>
+        <pc:cxnChg chg="add mod">
+          <ac:chgData name="Aaron Tayal" userId="32f02f1096a9313f" providerId="LiveId" clId="{C11DABC9-BF3D-4A70-A810-46CDD4C489DE}" dt="2023-11-16T21:55:38.172" v="377" actId="208"/>
+          <ac:cxnSpMkLst>
+            <pc:docMk/>
+            <pc:sldMk cId="2356962618" sldId="260"/>
+            <ac:cxnSpMk id="90" creationId="{6550DEA0-900B-9585-3CD6-CE778E09FE3C}"/>
+          </ac:cxnSpMkLst>
+        </pc:cxnChg>
+        <pc:cxnChg chg="add mod">
+          <ac:chgData name="Aaron Tayal" userId="32f02f1096a9313f" providerId="LiveId" clId="{C11DABC9-BF3D-4A70-A810-46CDD4C489DE}" dt="2023-11-16T21:57:25.419" v="394" actId="208"/>
+          <ac:cxnSpMkLst>
+            <pc:docMk/>
+            <pc:sldMk cId="2356962618" sldId="260"/>
+            <ac:cxnSpMk id="93" creationId="{CAE762B6-A4FC-C3D3-F85A-331066FED5AE}"/>
+          </ac:cxnSpMkLst>
+        </pc:cxnChg>
+        <pc:cxnChg chg="add mod">
+          <ac:chgData name="Aaron Tayal" userId="32f02f1096a9313f" providerId="LiveId" clId="{C11DABC9-BF3D-4A70-A810-46CDD4C489DE}" dt="2023-11-16T21:57:29.931" v="395" actId="208"/>
+          <ac:cxnSpMkLst>
+            <pc:docMk/>
+            <pc:sldMk cId="2356962618" sldId="260"/>
+            <ac:cxnSpMk id="97" creationId="{82484DBB-1A99-2B0C-95DB-2BCBC6B32B09}"/>
+          </ac:cxnSpMkLst>
+        </pc:cxnChg>
+        <pc:cxnChg chg="add mod">
+          <ac:chgData name="Aaron Tayal" userId="32f02f1096a9313f" providerId="LiveId" clId="{C11DABC9-BF3D-4A70-A810-46CDD4C489DE}" dt="2023-11-16T21:57:36.147" v="396" actId="208"/>
+          <ac:cxnSpMkLst>
+            <pc:docMk/>
+            <pc:sldMk cId="2356962618" sldId="260"/>
+            <ac:cxnSpMk id="99" creationId="{12CCD434-0BAB-7FF0-FD74-F03163E4D229}"/>
+          </ac:cxnSpMkLst>
+        </pc:cxnChg>
+        <pc:cxnChg chg="add mod">
+          <ac:chgData name="Aaron Tayal" userId="32f02f1096a9313f" providerId="LiveId" clId="{C11DABC9-BF3D-4A70-A810-46CDD4C489DE}" dt="2023-11-16T22:07:25.736" v="447" actId="1076"/>
+          <ac:cxnSpMkLst>
+            <pc:docMk/>
+            <pc:sldMk cId="2356962618" sldId="260"/>
+            <ac:cxnSpMk id="102" creationId="{67E20F32-2B02-0C79-C3BB-E106EF1917AD}"/>
+          </ac:cxnSpMkLst>
+        </pc:cxnChg>
+      </pc:sldChg>
+    </pc:docChg>
+  </pc:docChgLst>
+</pc:chgInfo>
+</file>
+
+<file path=ppt/ink/ink1.xml><?xml version="1.0" encoding="utf-8"?>
+<inkml:ink xmlns:inkml="http://www.w3.org/2003/InkML">
+  <inkml:definitions>
+    <inkml:context xml:id="ctx0">
+      <inkml:inkSource xml:id="inkSrc0">
+        <inkml:traceFormat>
+          <inkml:channel name="X" type="integer" min="-2.14748E9" max="2.14748E9" units="cm"/>
+          <inkml:channel name="Y" type="integer" min="-2.14748E9" max="2.14748E9" units="cm"/>
+          <inkml:channel name="F" type="integer" max="32767" units="dev"/>
+        </inkml:traceFormat>
+        <inkml:channelProperties>
+          <inkml:channelProperty channel="X" name="resolution" value="1000" units="1/cm"/>
+          <inkml:channelProperty channel="Y" name="resolution" value="1000" units="1/cm"/>
+          <inkml:channelProperty channel="F" name="resolution" value="0" units="1/dev"/>
+        </inkml:channelProperties>
+      </inkml:inkSource>
+      <inkml:timestamp xml:id="ts0" timeString="2023-11-16T21:40:30.050"/>
+    </inkml:context>
+    <inkml:brush xml:id="br0">
+      <inkml:brushProperty name="width" value="0.05" units="cm"/>
+      <inkml:brushProperty name="height" value="0.05" units="cm"/>
+      <inkml:brushProperty name="color" value="#004F8B"/>
+    </inkml:brush>
+  </inkml:definitions>
+  <inkml:trace contextRef="#ctx0" brushRef="#br0">64 0 24575,'-2'2'0,"-1"4"0,0 2 0,0 2 0,0 0 0,-4-2 0,1 0 0,0 1 0,0 1 0,1 1 0,-2-1 0,1 0 0,-1-2 0</inkml:trace>
+</inkml:ink>
+</file>
+
+<file path=ppt/ink/ink10.xml><?xml version="1.0" encoding="utf-8"?>
+<inkml:ink xmlns:inkml="http://www.w3.org/2003/InkML">
+  <inkml:definitions>
+    <inkml:context xml:id="ctx0">
+      <inkml:inkSource xml:id="inkSrc0">
+        <inkml:traceFormat>
+          <inkml:channel name="X" type="integer" min="-2.14748E9" max="2.14748E9" units="cm"/>
+          <inkml:channel name="Y" type="integer" min="-2.14748E9" max="2.14748E9" units="cm"/>
+          <inkml:channel name="F" type="integer" max="32767" units="dev"/>
+        </inkml:traceFormat>
+        <inkml:channelProperties>
+          <inkml:channelProperty channel="X" name="resolution" value="1000" units="1/cm"/>
+          <inkml:channelProperty channel="Y" name="resolution" value="1000" units="1/cm"/>
+          <inkml:channelProperty channel="F" name="resolution" value="0" units="1/dev"/>
+        </inkml:channelProperties>
+      </inkml:inkSource>
+      <inkml:timestamp xml:id="ts0" timeString="2023-11-16T21:40:54.212"/>
+    </inkml:context>
+    <inkml:brush xml:id="br0">
+      <inkml:brushProperty name="width" value="0.05" units="cm"/>
+      <inkml:brushProperty name="height" value="0.05" units="cm"/>
+      <inkml:brushProperty name="color" value="#004F8B"/>
+    </inkml:brush>
+  </inkml:definitions>
+  <inkml:trace contextRef="#ctx0" brushRef="#br0">84 1 24575,'-1'8'0,"-1"0"0,0 0 0,0 0 0,-1-1 0,0 1 0,0 0 0,-1-1 0,1 0 0,-2 0 0,1 0 0,-8 8 0,-11 21 0,7-12-1365</inkml:trace>
+</inkml:ink>
+</file>
+
+<file path=ppt/ink/ink11.xml><?xml version="1.0" encoding="utf-8"?>
+<inkml:ink xmlns:inkml="http://www.w3.org/2003/InkML">
+  <inkml:definitions>
+    <inkml:context xml:id="ctx0">
+      <inkml:inkSource xml:id="inkSrc0">
+        <inkml:traceFormat>
+          <inkml:channel name="X" type="integer" min="-2.14748E9" max="2.14748E9" units="cm"/>
+          <inkml:channel name="Y" type="integer" min="-2.14748E9" max="2.14748E9" units="cm"/>
+          <inkml:channel name="F" type="integer" max="32767" units="dev"/>
+        </inkml:traceFormat>
+        <inkml:channelProperties>
+          <inkml:channelProperty channel="X" name="resolution" value="1000" units="1/cm"/>
+          <inkml:channelProperty channel="Y" name="resolution" value="1000" units="1/cm"/>
+          <inkml:channelProperty channel="F" name="resolution" value="0" units="1/dev"/>
+        </inkml:channelProperties>
+      </inkml:inkSource>
+      <inkml:timestamp xml:id="ts0" timeString="2023-11-16T21:40:56.757"/>
+    </inkml:context>
+    <inkml:brush xml:id="br0">
+      <inkml:brushProperty name="width" value="0.05" units="cm"/>
+      <inkml:brushProperty name="height" value="0.05" units="cm"/>
+      <inkml:brushProperty name="color" value="#004F8B"/>
+    </inkml:brush>
+  </inkml:definitions>
+  <inkml:trace contextRef="#ctx0" brushRef="#br0">91 0 24575,'-1'1'0,"0"-1"0,0 1 0,1-1 0,-1 0 0,0 1 0,1 0 0,-1-1 0,0 1 0,1-1 0,-1 1 0,1 0 0,-1-1 0,1 1 0,-1 0 0,1 0 0,-1-1 0,1 1 0,0 0 0,-1 1 0,-8 21 0,7-16 0,-32 81 0,32-83 44,0-1-1,0 0 0,-1 1 0,1-1 1,-5 5-1,-4 7-1668,6-7-5201</inkml:trace>
+</inkml:ink>
+</file>
+
+<file path=ppt/ink/ink12.xml><?xml version="1.0" encoding="utf-8"?>
+<inkml:ink xmlns:inkml="http://www.w3.org/2003/InkML">
+  <inkml:definitions>
+    <inkml:context xml:id="ctx0">
+      <inkml:inkSource xml:id="inkSrc0">
+        <inkml:traceFormat>
+          <inkml:channel name="X" type="integer" min="-2.14748E9" max="2.14748E9" units="cm"/>
+          <inkml:channel name="Y" type="integer" min="-2.14748E9" max="2.14748E9" units="cm"/>
+          <inkml:channel name="F" type="integer" max="32767" units="dev"/>
+        </inkml:traceFormat>
+        <inkml:channelProperties>
+          <inkml:channelProperty channel="X" name="resolution" value="1000" units="1/cm"/>
+          <inkml:channelProperty channel="Y" name="resolution" value="1000" units="1/cm"/>
+          <inkml:channelProperty channel="F" name="resolution" value="0" units="1/dev"/>
+        </inkml:channelProperties>
+      </inkml:inkSource>
+      <inkml:timestamp xml:id="ts0" timeString="2023-11-16T21:41:01.179"/>
+    </inkml:context>
+    <inkml:brush xml:id="br0">
+      <inkml:brushProperty name="width" value="0.05" units="cm"/>
+      <inkml:brushProperty name="height" value="0.05" units="cm"/>
+      <inkml:brushProperty name="color" value="#004F8B"/>
+    </inkml:brush>
+  </inkml:definitions>
+  <inkml:trace contextRef="#ctx0" brushRef="#br0">76 1 24575,'0'12'0,"-1"0"0,-1 0 0,0 0 0,-1 0 0,0 0 0,0 0 0,-2-1 0,1 0 0,-1 0 0,-9 14 0,9-16 64,1 0-1,1 1 1,-5 17-1,-1 4-1682,5-20-5207</inkml:trace>
+</inkml:ink>
+</file>
+
+<file path=ppt/ink/ink13.xml><?xml version="1.0" encoding="utf-8"?>
+<inkml:ink xmlns:inkml="http://www.w3.org/2003/InkML">
+  <inkml:definitions>
+    <inkml:context xml:id="ctx0">
+      <inkml:inkSource xml:id="inkSrc0">
+        <inkml:traceFormat>
+          <inkml:channel name="X" type="integer" min="-2.14748E9" max="2.14748E9" units="cm"/>
+          <inkml:channel name="Y" type="integer" min="-2.14748E9" max="2.14748E9" units="cm"/>
+          <inkml:channel name="F" type="integer" max="32767" units="dev"/>
+        </inkml:traceFormat>
+        <inkml:channelProperties>
+          <inkml:channelProperty channel="X" name="resolution" value="1000" units="1/cm"/>
+          <inkml:channelProperty channel="Y" name="resolution" value="1000" units="1/cm"/>
+          <inkml:channelProperty channel="F" name="resolution" value="0" units="1/dev"/>
+        </inkml:channelProperties>
+      </inkml:inkSource>
+      <inkml:timestamp xml:id="ts0" timeString="2023-11-16T22:05:18.558"/>
+    </inkml:context>
+    <inkml:brush xml:id="br0">
+      <inkml:brushProperty name="width" value="0.05" units="cm"/>
+      <inkml:brushProperty name="height" value="0.05" units="cm"/>
+      <inkml:brushProperty name="color" value="#7F6000"/>
+    </inkml:brush>
+  </inkml:definitions>
+  <inkml:trace contextRef="#ctx0" brushRef="#br0">1 23 24575,'0'3'0,"-1"1"0,1 0 0,0 0 0,0-1 0,1 1 0,-1 0 0,1 0 0,0-1 0,0 1 0,0 0 0,0-1 0,0 1 0,1-1 0,0 0 0,0 1 0,0-1 0,0 0 0,0 0 0,1 0 0,3 3 0,19 21 0,-19-20 0,0-1 0,0 0 0,1 0 0,0 0 0,0 0 0,14 7 0,-2-5 0,1 0 0,0-1 0,0-2 0,0 0 0,1-1 0,0-1 0,0-1 0,0 0 0,0-2 0,33-4 0,-47 3 0,-1 0 0,0-1 0,1 0 0,-1 0 0,0-1 0,-1 0 0,1 0 0,11-7 0,-4 0 0,0-1 0,15-14 0,-8-2 0,-18 24 0,-1 0 0,1 0 0,0 0 0,0 0 0,0 0 0,1 1 0,-1-1 0,1 1 0,-1 0 0,1 0 0,0 0 0,0 0 0,0 0 0,4-2 0,0 2-97,0-1-1,0 0 1,0 0-1,-1-1 1,1 0-1,-1 0 1,0 0-1,0-1 1,0 0-1,-1 0 1,0-1-1,0 1 0,6-9 1,-5 4-6729</inkml:trace>
+</inkml:ink>
+</file>
+
+<file path=ppt/ink/ink2.xml><?xml version="1.0" encoding="utf-8"?>
+<inkml:ink xmlns:inkml="http://www.w3.org/2003/InkML">
+  <inkml:definitions>
+    <inkml:context xml:id="ctx0">
+      <inkml:inkSource xml:id="inkSrc0">
+        <inkml:traceFormat>
+          <inkml:channel name="X" type="integer" min="-2.14748E9" max="2.14748E9" units="cm"/>
+          <inkml:channel name="Y" type="integer" min="-2.14748E9" max="2.14748E9" units="cm"/>
+          <inkml:channel name="F" type="integer" max="32767" units="dev"/>
+        </inkml:traceFormat>
+        <inkml:channelProperties>
+          <inkml:channelProperty channel="X" name="resolution" value="1000" units="1/cm"/>
+          <inkml:channelProperty channel="Y" name="resolution" value="1000" units="1/cm"/>
+          <inkml:channelProperty channel="F" name="resolution" value="0" units="1/dev"/>
+        </inkml:channelProperties>
+      </inkml:inkSource>
+      <inkml:timestamp xml:id="ts0" timeString="2023-11-16T21:40:31.202"/>
+    </inkml:context>
+    <inkml:brush xml:id="br0">
+      <inkml:brushProperty name="width" value="0.05" units="cm"/>
+      <inkml:brushProperty name="height" value="0.05" units="cm"/>
+      <inkml:brushProperty name="color" value="#004F8B"/>
+    </inkml:brush>
+  </inkml:definitions>
+  <inkml:trace contextRef="#ctx0" brushRef="#br0">107 1 24575,'-1'1'0,"0"1"0,0 0 0,-1-1 0,1 1 0,0-1 0,0 1 0,-1-1 0,1 0 0,-1 0 0,1 1 0,-3 0 0,-12 12 0,10-5 0,-1 2 0,1-1 0,-1-1 0,-14 14 0,18-20-195,0 1 0,0-1 0,1 0 0,-1 1 0,0-1 0,-2 8 0,1-3-6631</inkml:trace>
+</inkml:ink>
+</file>
+
+<file path=ppt/ink/ink3.xml><?xml version="1.0" encoding="utf-8"?>
+<inkml:ink xmlns:inkml="http://www.w3.org/2003/InkML">
+  <inkml:definitions>
+    <inkml:context xml:id="ctx0">
+      <inkml:inkSource xml:id="inkSrc0">
+        <inkml:traceFormat>
+          <inkml:channel name="X" type="integer" min="-2.14748E9" max="2.14748E9" units="cm"/>
+          <inkml:channel name="Y" type="integer" min="-2.14748E9" max="2.14748E9" units="cm"/>
+          <inkml:channel name="F" type="integer" max="32767" units="dev"/>
+        </inkml:traceFormat>
+        <inkml:channelProperties>
+          <inkml:channelProperty channel="X" name="resolution" value="1000" units="1/cm"/>
+          <inkml:channelProperty channel="Y" name="resolution" value="1000" units="1/cm"/>
+          <inkml:channelProperty channel="F" name="resolution" value="0" units="1/dev"/>
+        </inkml:channelProperties>
+      </inkml:inkSource>
+      <inkml:timestamp xml:id="ts0" timeString="2023-11-16T21:40:32.269"/>
+    </inkml:context>
+    <inkml:brush xml:id="br0">
+      <inkml:brushProperty name="width" value="0.05" units="cm"/>
+      <inkml:brushProperty name="height" value="0.05" units="cm"/>
+      <inkml:brushProperty name="color" value="#004F8B"/>
+    </inkml:brush>
+  </inkml:definitions>
+  <inkml:trace contextRef="#ctx0" brushRef="#br0">161 1 24575,'-1'2'0,"1"0"0,0 0 0,0 0 0,-1 1 0,1-1 0,-1 0 0,0 0 0,0 0 0,0 0 0,0 0 0,0 0 0,0 0 0,0-1 0,-1 1 0,-1 2 0,-30 23 0,3-3 0,-5 5 325,30-26-536,-1 1-1,1 0 1,0 0 0,1 0 0,-1 1-1,1-1 1,-5 7 0,5-3-6615</inkml:trace>
+</inkml:ink>
+</file>
+
+<file path=ppt/ink/ink4.xml><?xml version="1.0" encoding="utf-8"?>
+<inkml:ink xmlns:inkml="http://www.w3.org/2003/InkML">
+  <inkml:definitions>
+    <inkml:context xml:id="ctx0">
+      <inkml:inkSource xml:id="inkSrc0">
+        <inkml:traceFormat>
+          <inkml:channel name="X" type="integer" min="-2.14748E9" max="2.14748E9" units="cm"/>
+          <inkml:channel name="Y" type="integer" min="-2.14748E9" max="2.14748E9" units="cm"/>
+          <inkml:channel name="F" type="integer" max="32767" units="dev"/>
+        </inkml:traceFormat>
+        <inkml:channelProperties>
+          <inkml:channelProperty channel="X" name="resolution" value="1000" units="1/cm"/>
+          <inkml:channelProperty channel="Y" name="resolution" value="1000" units="1/cm"/>
+          <inkml:channelProperty channel="F" name="resolution" value="0" units="1/dev"/>
+        </inkml:channelProperties>
+      </inkml:inkSource>
+      <inkml:timestamp xml:id="ts0" timeString="2023-11-16T21:40:33.512"/>
+    </inkml:context>
+    <inkml:brush xml:id="br0">
+      <inkml:brushProperty name="width" value="0.05" units="cm"/>
+      <inkml:brushProperty name="height" value="0.05" units="cm"/>
+      <inkml:brushProperty name="color" value="#004F8B"/>
+    </inkml:brush>
+  </inkml:definitions>
+  <inkml:trace contextRef="#ctx0" brushRef="#br0">151 1 24575,'0'1'0,"-1"1"0,1-1 0,0 1 0,-1 0 0,1-1 0,-1 1 0,1-1 0,-1 0 0,0 1 0,1-1 0,-1 1 0,0-1 0,0 0 0,0 0 0,-3 3 0,-22 17 0,2-2 0,7 3 0,15-19 0,0 0 0,0 0 0,0 0 0,-1 0 0,1 0 0,-1 0 0,1-1 0,-1 0 0,0 1 0,0-1 0,0 0 0,-6 2 0,5-2-195,0 0 0,0 0 0,0 0 0,1 1 0,-1-1 0,-5 6 0</inkml:trace>
+</inkml:ink>
+</file>
+
+<file path=ppt/ink/ink5.xml><?xml version="1.0" encoding="utf-8"?>
+<inkml:ink xmlns:inkml="http://www.w3.org/2003/InkML">
+  <inkml:definitions>
+    <inkml:context xml:id="ctx0">
+      <inkml:inkSource xml:id="inkSrc0">
+        <inkml:traceFormat>
+          <inkml:channel name="X" type="integer" min="-2.14748E9" max="2.14748E9" units="cm"/>
+          <inkml:channel name="Y" type="integer" min="-2.14748E9" max="2.14748E9" units="cm"/>
+          <inkml:channel name="F" type="integer" max="32767" units="dev"/>
+        </inkml:traceFormat>
+        <inkml:channelProperties>
+          <inkml:channelProperty channel="X" name="resolution" value="1000" units="1/cm"/>
+          <inkml:channelProperty channel="Y" name="resolution" value="1000" units="1/cm"/>
+          <inkml:channelProperty channel="F" name="resolution" value="0" units="1/dev"/>
+        </inkml:channelProperties>
+      </inkml:inkSource>
+      <inkml:timestamp xml:id="ts0" timeString="2023-11-16T21:40:35.073"/>
+    </inkml:context>
+    <inkml:brush xml:id="br0">
+      <inkml:brushProperty name="width" value="0.05" units="cm"/>
+      <inkml:brushProperty name="height" value="0.05" units="cm"/>
+      <inkml:brushProperty name="color" value="#004F8B"/>
+    </inkml:brush>
+  </inkml:definitions>
+  <inkml:trace contextRef="#ctx0" brushRef="#br0">120 0 24575,'-3'2'0,"-2"1"0,-1 3 0,-1-1 0,0 2 0,-1 2 0,1 1 0,0 0 0,-2-1 0,-1 2 0,-2 0 0,0-1 0,1-1 0,3 2 0,0-3 0</inkml:trace>
+</inkml:ink>
+</file>
+
+<file path=ppt/ink/ink6.xml><?xml version="1.0" encoding="utf-8"?>
+<inkml:ink xmlns:inkml="http://www.w3.org/2003/InkML">
+  <inkml:definitions>
+    <inkml:context xml:id="ctx0">
+      <inkml:inkSource xml:id="inkSrc0">
+        <inkml:traceFormat>
+          <inkml:channel name="X" type="integer" min="-2.14748E9" max="2.14748E9" units="cm"/>
+          <inkml:channel name="Y" type="integer" min="-2.14748E9" max="2.14748E9" units="cm"/>
+          <inkml:channel name="F" type="integer" max="32767" units="dev"/>
+        </inkml:traceFormat>
+        <inkml:channelProperties>
+          <inkml:channelProperty channel="X" name="resolution" value="1000" units="1/cm"/>
+          <inkml:channelProperty channel="Y" name="resolution" value="1000" units="1/cm"/>
+          <inkml:channelProperty channel="F" name="resolution" value="0" units="1/dev"/>
+        </inkml:channelProperties>
+      </inkml:inkSource>
+      <inkml:timestamp xml:id="ts0" timeString="2023-11-16T21:40:37.871"/>
+    </inkml:context>
+    <inkml:brush xml:id="br0">
+      <inkml:brushProperty name="width" value="0.05" units="cm"/>
+      <inkml:brushProperty name="height" value="0.05" units="cm"/>
+      <inkml:brushProperty name="color" value="#004F8B"/>
+    </inkml:brush>
+  </inkml:definitions>
+  <inkml:trace contextRef="#ctx0" brushRef="#br0">108 1 24575,'0'2'0,"-2"1"0,-1 2 0,-3 1 0,1 0 0,0 3 0,0-1 0,0 1 0,-2-1 0,-1-1 0,-2 3 0,-1 0 0,0 2 0,1-2 0,0-3 0,0 1 0</inkml:trace>
+</inkml:ink>
+</file>
+
+<file path=ppt/ink/ink7.xml><?xml version="1.0" encoding="utf-8"?>
+<inkml:ink xmlns:inkml="http://www.w3.org/2003/InkML">
+  <inkml:definitions>
+    <inkml:context xml:id="ctx0">
+      <inkml:inkSource xml:id="inkSrc0">
+        <inkml:traceFormat>
+          <inkml:channel name="X" type="integer" min="-2.14748E9" max="2.14748E9" units="cm"/>
+          <inkml:channel name="Y" type="integer" min="-2.14748E9" max="2.14748E9" units="cm"/>
+          <inkml:channel name="F" type="integer" max="32767" units="dev"/>
+        </inkml:traceFormat>
+        <inkml:channelProperties>
+          <inkml:channelProperty channel="X" name="resolution" value="1000" units="1/cm"/>
+          <inkml:channelProperty channel="Y" name="resolution" value="1000" units="1/cm"/>
+          <inkml:channelProperty channel="F" name="resolution" value="0" units="1/dev"/>
+        </inkml:channelProperties>
+      </inkml:inkSource>
+      <inkml:timestamp xml:id="ts0" timeString="2023-11-16T21:40:46.886"/>
+    </inkml:context>
+    <inkml:brush xml:id="br0">
+      <inkml:brushProperty name="width" value="0.05" units="cm"/>
+      <inkml:brushProperty name="height" value="0.05" units="cm"/>
+      <inkml:brushProperty name="color" value="#004F8B"/>
+    </inkml:brush>
+  </inkml:definitions>
+  <inkml:trace contextRef="#ctx0" brushRef="#br0">118 1 24575,'-12'13'111,"1"1"0,-18 29 0,22-31-394,-1 0 0,-1 0 0,0-1 0,0 0 0,-14 12 0</inkml:trace>
+</inkml:ink>
+</file>
+
+<file path=ppt/ink/ink8.xml><?xml version="1.0" encoding="utf-8"?>
+<inkml:ink xmlns:inkml="http://www.w3.org/2003/InkML">
+  <inkml:definitions>
+    <inkml:context xml:id="ctx0">
+      <inkml:inkSource xml:id="inkSrc0">
+        <inkml:traceFormat>
+          <inkml:channel name="X" type="integer" min="-2.14748E9" max="2.14748E9" units="cm"/>
+          <inkml:channel name="Y" type="integer" min="-2.14748E9" max="2.14748E9" units="cm"/>
+          <inkml:channel name="F" type="integer" max="32767" units="dev"/>
+        </inkml:traceFormat>
+        <inkml:channelProperties>
+          <inkml:channelProperty channel="X" name="resolution" value="1000" units="1/cm"/>
+          <inkml:channelProperty channel="Y" name="resolution" value="1000" units="1/cm"/>
+          <inkml:channelProperty channel="F" name="resolution" value="0" units="1/dev"/>
+        </inkml:channelProperties>
+      </inkml:inkSource>
+      <inkml:timestamp xml:id="ts0" timeString="2023-11-16T21:40:49.332"/>
+    </inkml:context>
+    <inkml:brush xml:id="br0">
+      <inkml:brushProperty name="width" value="0.05" units="cm"/>
+      <inkml:brushProperty name="height" value="0.05" units="cm"/>
+      <inkml:brushProperty name="color" value="#004F8B"/>
+    </inkml:brush>
+  </inkml:definitions>
+  <inkml:trace contextRef="#ctx0" brushRef="#br0">79 1 24575,'0'2'0,"0"3"0,-2 3 0,-1 3 0,-2 1 0,-3-1 0,0-1 0,2 2 0,1-1 0,0-1 0,1 0 0,-2-2 0,0 0 0,2 1 0,-1-2 0,0 2 0,-1-2 0</inkml:trace>
+</inkml:ink>
+</file>
+
+<file path=ppt/ink/ink9.xml><?xml version="1.0" encoding="utf-8"?>
+<inkml:ink xmlns:inkml="http://www.w3.org/2003/InkML">
+  <inkml:definitions>
+    <inkml:context xml:id="ctx0">
+      <inkml:inkSource xml:id="inkSrc0">
+        <inkml:traceFormat>
+          <inkml:channel name="X" type="integer" min="-2.14748E9" max="2.14748E9" units="cm"/>
+          <inkml:channel name="Y" type="integer" min="-2.14748E9" max="2.14748E9" units="cm"/>
+          <inkml:channel name="F" type="integer" max="32767" units="dev"/>
+        </inkml:traceFormat>
+        <inkml:channelProperties>
+          <inkml:channelProperty channel="X" name="resolution" value="1000" units="1/cm"/>
+          <inkml:channelProperty channel="Y" name="resolution" value="1000" units="1/cm"/>
+          <inkml:channelProperty channel="F" name="resolution" value="0" units="1/dev"/>
+        </inkml:channelProperties>
+      </inkml:inkSource>
+      <inkml:timestamp xml:id="ts0" timeString="2023-11-16T21:40:51.983"/>
+    </inkml:context>
+    <inkml:brush xml:id="br0">
+      <inkml:brushProperty name="width" value="0.05" units="cm"/>
+      <inkml:brushProperty name="height" value="0.05" units="cm"/>
+      <inkml:brushProperty name="color" value="#004F8B"/>
+    </inkml:brush>
+  </inkml:definitions>
+  <inkml:trace contextRef="#ctx0" brushRef="#br0">65 0 24575,'0'3'0,"0"2"0,0 3 0,-2 0 0,-1 2 0,0 0 0,-2 1 0,1 1 0,-2-1 0,0-1 0,1 1 0,-1-2 0,1 0 0,-1-2 0,0 1 0,2 1 0,1 1 0</inkml:trace>
+</inkml:ink>
+</file>
+
 <file path=ppt/slideLayouts/slideLayout1.xml><?xml version="1.0" encoding="utf-8"?>
 <p:sldLayout xmlns:a="http://schemas.openxmlformats.org/drawingml/2006/main" xmlns:r="http://schemas.openxmlformats.org/officeDocument/2006/relationships" xmlns:p="http://schemas.openxmlformats.org/presentationml/2006/main" type="title" preserve="1">
   <p:cSld name="Title Slide">
@@ -261,7 +1094,7 @@
           <a:p>
             <a:fld id="{943D8B94-663A-49B8-9927-53B2D9657FEA}" type="datetimeFigureOut">
               <a:rPr lang="en-US" smtClean="0"/>
-              <a:t>11/6/2023</a:t>
+              <a:t>11/16/2023</a:t>
             </a:fld>
             <a:endParaRPr lang="en-US"/>
           </a:p>
@@ -459,7 +1292,7 @@
           <a:p>
             <a:fld id="{943D8B94-663A-49B8-9927-53B2D9657FEA}" type="datetimeFigureOut">
               <a:rPr lang="en-US" smtClean="0"/>
-              <a:t>11/6/2023</a:t>
+              <a:t>11/16/2023</a:t>
             </a:fld>
             <a:endParaRPr lang="en-US"/>
           </a:p>
@@ -667,7 +1500,7 @@
           <a:p>
             <a:fld id="{943D8B94-663A-49B8-9927-53B2D9657FEA}" type="datetimeFigureOut">
               <a:rPr lang="en-US" smtClean="0"/>
-              <a:t>11/6/2023</a:t>
+              <a:t>11/16/2023</a:t>
             </a:fld>
             <a:endParaRPr lang="en-US"/>
           </a:p>
@@ -865,7 +1698,7 @@
           <a:p>
             <a:fld id="{943D8B94-663A-49B8-9927-53B2D9657FEA}" type="datetimeFigureOut">
               <a:rPr lang="en-US" smtClean="0"/>
-              <a:t>11/6/2023</a:t>
+              <a:t>11/16/2023</a:t>
             </a:fld>
             <a:endParaRPr lang="en-US"/>
           </a:p>
@@ -1140,7 +1973,7 @@
           <a:p>
             <a:fld id="{943D8B94-663A-49B8-9927-53B2D9657FEA}" type="datetimeFigureOut">
               <a:rPr lang="en-US" smtClean="0"/>
-              <a:t>11/6/2023</a:t>
+              <a:t>11/16/2023</a:t>
             </a:fld>
             <a:endParaRPr lang="en-US"/>
           </a:p>
@@ -1405,7 +2238,7 @@
           <a:p>
             <a:fld id="{943D8B94-663A-49B8-9927-53B2D9657FEA}" type="datetimeFigureOut">
               <a:rPr lang="en-US" smtClean="0"/>
-              <a:t>11/6/2023</a:t>
+              <a:t>11/16/2023</a:t>
             </a:fld>
             <a:endParaRPr lang="en-US"/>
           </a:p>
@@ -1817,7 +2650,7 @@
           <a:p>
             <a:fld id="{943D8B94-663A-49B8-9927-53B2D9657FEA}" type="datetimeFigureOut">
               <a:rPr lang="en-US" smtClean="0"/>
-              <a:t>11/6/2023</a:t>
+              <a:t>11/16/2023</a:t>
             </a:fld>
             <a:endParaRPr lang="en-US"/>
           </a:p>
@@ -1958,7 +2791,7 @@
           <a:p>
             <a:fld id="{943D8B94-663A-49B8-9927-53B2D9657FEA}" type="datetimeFigureOut">
               <a:rPr lang="en-US" smtClean="0"/>
-              <a:t>11/6/2023</a:t>
+              <a:t>11/16/2023</a:t>
             </a:fld>
             <a:endParaRPr lang="en-US"/>
           </a:p>
@@ -2071,7 +2904,7 @@
           <a:p>
             <a:fld id="{943D8B94-663A-49B8-9927-53B2D9657FEA}" type="datetimeFigureOut">
               <a:rPr lang="en-US" smtClean="0"/>
-              <a:t>11/6/2023</a:t>
+              <a:t>11/16/2023</a:t>
             </a:fld>
             <a:endParaRPr lang="en-US"/>
           </a:p>
@@ -2382,7 +3215,7 @@
           <a:p>
             <a:fld id="{943D8B94-663A-49B8-9927-53B2D9657FEA}" type="datetimeFigureOut">
               <a:rPr lang="en-US" smtClean="0"/>
-              <a:t>11/6/2023</a:t>
+              <a:t>11/16/2023</a:t>
             </a:fld>
             <a:endParaRPr lang="en-US"/>
           </a:p>
@@ -2670,7 +3503,7 @@
           <a:p>
             <a:fld id="{943D8B94-663A-49B8-9927-53B2D9657FEA}" type="datetimeFigureOut">
               <a:rPr lang="en-US" smtClean="0"/>
-              <a:t>11/6/2023</a:t>
+              <a:t>11/16/2023</a:t>
             </a:fld>
             <a:endParaRPr lang="en-US"/>
           </a:p>
@@ -2911,7 +3744,7 @@
           <a:p>
             <a:fld id="{943D8B94-663A-49B8-9927-53B2D9657FEA}" type="datetimeFigureOut">
               <a:rPr lang="en-US" smtClean="0"/>
-              <a:t>11/6/2023</a:t>
+              <a:t>11/16/2023</a:t>
             </a:fld>
             <a:endParaRPr lang="en-US"/>
           </a:p>
@@ -3781,6 +4614,1838 @@
       </p:grpSpPr>
       <p:pic>
         <p:nvPicPr>
+          <p:cNvPr id="4" name="Content Placeholder 4" descr="A drawing of a beetle&#10;&#10;Description automatically generated">
+            <a:extLst>
+              <a:ext uri="{FF2B5EF4-FFF2-40B4-BE49-F238E27FC236}">
+                <a16:creationId xmlns:a16="http://schemas.microsoft.com/office/drawing/2014/main" id="{DEA815E6-529D-7045-5D5B-F93B0CF64E17}"/>
+              </a:ext>
+            </a:extLst>
+          </p:cNvPr>
+          <p:cNvPicPr>
+            <a:picLocks noChangeAspect="1"/>
+          </p:cNvPicPr>
+          <p:nvPr/>
+        </p:nvPicPr>
+        <p:blipFill>
+          <a:blip r:embed="rId2">
+            <a:extLst>
+              <a:ext uri="{28A0092B-C50C-407E-A947-70E740481C1C}">
+                <a14:useLocalDpi xmlns:a14="http://schemas.microsoft.com/office/drawing/2010/main" val="0"/>
+              </a:ext>
+            </a:extLst>
+          </a:blip>
+          <a:stretch>
+            <a:fillRect/>
+          </a:stretch>
+        </p:blipFill>
+        <p:spPr>
+          <a:xfrm rot="16200000">
+            <a:off x="2481106" y="-2171116"/>
+            <a:ext cx="6987269" cy="10747112"/>
+          </a:xfrm>
+          <a:prstGeom prst="rect">
+            <a:avLst/>
+          </a:prstGeom>
+        </p:spPr>
+      </p:pic>
+      <p:sp>
+        <p:nvSpPr>
+          <p:cNvPr id="8" name="TextBox 7">
+            <a:extLst>
+              <a:ext uri="{FF2B5EF4-FFF2-40B4-BE49-F238E27FC236}">
+                <a16:creationId xmlns:a16="http://schemas.microsoft.com/office/drawing/2014/main" id="{EB762454-4A19-92AB-5DA1-1E4956BA4E69}"/>
+              </a:ext>
+            </a:extLst>
+          </p:cNvPr>
+          <p:cNvSpPr txBox="1"/>
+          <p:nvPr/>
+        </p:nvSpPr>
+        <p:spPr>
+          <a:xfrm>
+            <a:off x="2461700" y="3617984"/>
+            <a:ext cx="45719" cy="477054"/>
+          </a:xfrm>
+          <a:prstGeom prst="rect">
+            <a:avLst/>
+          </a:prstGeom>
+          <a:noFill/>
+        </p:spPr>
+        <p:txBody>
+          <a:bodyPr wrap="square" rtlCol="0">
+            <a:spAutoFit/>
+          </a:bodyPr>
+          <a:lstStyle/>
+          <a:p>
+            <a:r>
+              <a:rPr lang="en-US" sz="2500" b="1" dirty="0">
+                <a:solidFill>
+                  <a:srgbClr val="004F8B"/>
+                </a:solidFill>
+                <a:latin typeface="Bradley Hand ITC" panose="03070402050302030203" pitchFamily="66" charset="0"/>
+                <a:cs typeface="Arial" panose="020B0604020202020204" pitchFamily="34" charset="0"/>
+              </a:rPr>
+              <a:t>b</a:t>
+            </a:r>
+          </a:p>
+        </p:txBody>
+      </p:sp>
+      <p:cxnSp>
+        <p:nvCxnSpPr>
+          <p:cNvPr id="9" name="Straight Connector 8">
+            <a:extLst>
+              <a:ext uri="{FF2B5EF4-FFF2-40B4-BE49-F238E27FC236}">
+                <a16:creationId xmlns:a16="http://schemas.microsoft.com/office/drawing/2014/main" id="{656E75F0-39DB-C8CA-1328-65B3DF9B9A0D}"/>
+              </a:ext>
+            </a:extLst>
+          </p:cNvPr>
+          <p:cNvCxnSpPr>
+            <a:cxnSpLocks/>
+          </p:cNvCxnSpPr>
+          <p:nvPr/>
+        </p:nvCxnSpPr>
+        <p:spPr>
+          <a:xfrm>
+            <a:off x="2912724" y="2388742"/>
+            <a:ext cx="167400" cy="1040258"/>
+          </a:xfrm>
+          <a:prstGeom prst="line">
+            <a:avLst/>
+          </a:prstGeom>
+          <a:ln w="19050">
+            <a:solidFill>
+              <a:srgbClr val="FFC000"/>
+            </a:solidFill>
+          </a:ln>
+        </p:spPr>
+        <p:style>
+          <a:lnRef idx="1">
+            <a:schemeClr val="accent1"/>
+          </a:lnRef>
+          <a:fillRef idx="0">
+            <a:schemeClr val="accent1"/>
+          </a:fillRef>
+          <a:effectRef idx="0">
+            <a:schemeClr val="accent1"/>
+          </a:effectRef>
+          <a:fontRef idx="minor">
+            <a:schemeClr val="tx1"/>
+          </a:fontRef>
+        </p:style>
+      </p:cxnSp>
+      <p:sp>
+        <p:nvSpPr>
+          <p:cNvPr id="13" name="TextBox 12">
+            <a:extLst>
+              <a:ext uri="{FF2B5EF4-FFF2-40B4-BE49-F238E27FC236}">
+                <a16:creationId xmlns:a16="http://schemas.microsoft.com/office/drawing/2014/main" id="{9048FAB7-97D3-77C9-4906-47340E7F4577}"/>
+              </a:ext>
+            </a:extLst>
+          </p:cNvPr>
+          <p:cNvSpPr txBox="1"/>
+          <p:nvPr/>
+        </p:nvSpPr>
+        <p:spPr>
+          <a:xfrm>
+            <a:off x="2772898" y="2621970"/>
+            <a:ext cx="45719" cy="477054"/>
+          </a:xfrm>
+          <a:prstGeom prst="rect">
+            <a:avLst/>
+          </a:prstGeom>
+          <a:noFill/>
+        </p:spPr>
+        <p:txBody>
+          <a:bodyPr wrap="square" rtlCol="0">
+            <a:spAutoFit/>
+          </a:bodyPr>
+          <a:lstStyle/>
+          <a:p>
+            <a:r>
+              <a:rPr lang="en-US" sz="2500" b="1" dirty="0">
+                <a:solidFill>
+                  <a:srgbClr val="FFC000"/>
+                </a:solidFill>
+                <a:latin typeface="Bradley Hand ITC" panose="03070402050302030203" pitchFamily="66" charset="0"/>
+                <a:cs typeface="Arial" panose="020B0604020202020204" pitchFamily="34" charset="0"/>
+              </a:rPr>
+              <a:t>e</a:t>
+            </a:r>
+          </a:p>
+        </p:txBody>
+      </p:sp>
+      <p:cxnSp>
+        <p:nvCxnSpPr>
+          <p:cNvPr id="22" name="Straight Connector 21">
+            <a:extLst>
+              <a:ext uri="{FF2B5EF4-FFF2-40B4-BE49-F238E27FC236}">
+                <a16:creationId xmlns:a16="http://schemas.microsoft.com/office/drawing/2014/main" id="{F97DBC35-7175-CC95-595C-A8C6F48108FF}"/>
+              </a:ext>
+            </a:extLst>
+          </p:cNvPr>
+          <p:cNvCxnSpPr>
+            <a:cxnSpLocks/>
+          </p:cNvCxnSpPr>
+          <p:nvPr/>
+        </p:nvCxnSpPr>
+        <p:spPr>
+          <a:xfrm>
+            <a:off x="2998810" y="2504661"/>
+            <a:ext cx="122261" cy="783203"/>
+          </a:xfrm>
+          <a:prstGeom prst="line">
+            <a:avLst/>
+          </a:prstGeom>
+          <a:ln w="19050">
+            <a:solidFill>
+              <a:schemeClr val="accent2"/>
+            </a:solidFill>
+          </a:ln>
+        </p:spPr>
+        <p:style>
+          <a:lnRef idx="1">
+            <a:schemeClr val="accent1"/>
+          </a:lnRef>
+          <a:fillRef idx="0">
+            <a:schemeClr val="accent1"/>
+          </a:fillRef>
+          <a:effectRef idx="0">
+            <a:schemeClr val="accent1"/>
+          </a:effectRef>
+          <a:fontRef idx="minor">
+            <a:schemeClr val="tx1"/>
+          </a:fontRef>
+        </p:style>
+      </p:cxnSp>
+      <p:sp>
+        <p:nvSpPr>
+          <p:cNvPr id="30" name="TextBox 29">
+            <a:extLst>
+              <a:ext uri="{FF2B5EF4-FFF2-40B4-BE49-F238E27FC236}">
+                <a16:creationId xmlns:a16="http://schemas.microsoft.com/office/drawing/2014/main" id="{F8BE0526-17CC-1CC6-6FCE-FB1E72EBF6C4}"/>
+              </a:ext>
+            </a:extLst>
+          </p:cNvPr>
+          <p:cNvSpPr txBox="1"/>
+          <p:nvPr/>
+        </p:nvSpPr>
+        <p:spPr>
+          <a:xfrm>
+            <a:off x="3057265" y="2575587"/>
+            <a:ext cx="45719" cy="477054"/>
+          </a:xfrm>
+          <a:prstGeom prst="rect">
+            <a:avLst/>
+          </a:prstGeom>
+          <a:noFill/>
+        </p:spPr>
+        <p:txBody>
+          <a:bodyPr wrap="square" rtlCol="0">
+            <a:spAutoFit/>
+          </a:bodyPr>
+          <a:lstStyle/>
+          <a:p>
+            <a:r>
+              <a:rPr lang="en-US" sz="2500" b="1" dirty="0">
+                <a:solidFill>
+                  <a:schemeClr val="accent2"/>
+                </a:solidFill>
+                <a:latin typeface="Bradley Hand ITC" panose="03070402050302030203" pitchFamily="66" charset="0"/>
+                <a:cs typeface="Arial" panose="020B0604020202020204" pitchFamily="34" charset="0"/>
+              </a:rPr>
+              <a:t>f</a:t>
+            </a:r>
+          </a:p>
+        </p:txBody>
+      </p:sp>
+      <p:sp>
+        <p:nvSpPr>
+          <p:cNvPr id="35" name="TextBox 34">
+            <a:extLst>
+              <a:ext uri="{FF2B5EF4-FFF2-40B4-BE49-F238E27FC236}">
+                <a16:creationId xmlns:a16="http://schemas.microsoft.com/office/drawing/2014/main" id="{F851F3F3-0B0A-CF83-5880-235977439D9E}"/>
+              </a:ext>
+            </a:extLst>
+          </p:cNvPr>
+          <p:cNvSpPr txBox="1"/>
+          <p:nvPr/>
+        </p:nvSpPr>
+        <p:spPr>
+          <a:xfrm>
+            <a:off x="2993017" y="3352373"/>
+            <a:ext cx="45719" cy="477054"/>
+          </a:xfrm>
+          <a:prstGeom prst="rect">
+            <a:avLst/>
+          </a:prstGeom>
+          <a:noFill/>
+        </p:spPr>
+        <p:txBody>
+          <a:bodyPr wrap="square" rtlCol="0">
+            <a:spAutoFit/>
+          </a:bodyPr>
+          <a:lstStyle/>
+          <a:p>
+            <a:r>
+              <a:rPr lang="en-US" sz="2500" b="1" dirty="0">
+                <a:solidFill>
+                  <a:schemeClr val="accent4">
+                    <a:lumMod val="50000"/>
+                  </a:schemeClr>
+                </a:solidFill>
+                <a:latin typeface="Bradley Hand ITC" panose="03070402050302030203" pitchFamily="66" charset="0"/>
+                <a:cs typeface="Arial" panose="020B0604020202020204" pitchFamily="34" charset="0"/>
+              </a:rPr>
+              <a:t>g</a:t>
+            </a:r>
+          </a:p>
+        </p:txBody>
+      </p:sp>
+      <p:grpSp>
+        <p:nvGrpSpPr>
+          <p:cNvPr id="46" name="Group 45">
+            <a:extLst>
+              <a:ext uri="{FF2B5EF4-FFF2-40B4-BE49-F238E27FC236}">
+                <a16:creationId xmlns:a16="http://schemas.microsoft.com/office/drawing/2014/main" id="{A84DE551-BDF5-D3C5-EEFA-20DCB209A055}"/>
+              </a:ext>
+            </a:extLst>
+          </p:cNvPr>
+          <p:cNvGrpSpPr/>
+          <p:nvPr/>
+        </p:nvGrpSpPr>
+        <p:grpSpPr>
+          <a:xfrm>
+            <a:off x="2430019" y="3339758"/>
+            <a:ext cx="448200" cy="457200"/>
+            <a:chOff x="2430019" y="3339758"/>
+            <a:chExt cx="448200" cy="457200"/>
+          </a:xfrm>
+        </p:grpSpPr>
+        <mc:AlternateContent xmlns:mc="http://schemas.openxmlformats.org/markup-compatibility/2006">
+          <mc:Choice xmlns:p14="http://schemas.microsoft.com/office/powerpoint/2010/main" Requires="p14">
+            <p:contentPart p14:bwMode="auto" r:id="rId3">
+              <p14:nvContentPartPr>
+                <p14:cNvPr id="38" name="Ink 37">
+                  <a:extLst>
+                    <a:ext uri="{FF2B5EF4-FFF2-40B4-BE49-F238E27FC236}">
+                      <a16:creationId xmlns:a16="http://schemas.microsoft.com/office/drawing/2014/main" id="{7243E7C3-BCF1-0950-3E01-862EC79A4C63}"/>
+                    </a:ext>
+                  </a:extLst>
+                </p14:cNvPr>
+                <p14:cNvContentPartPr/>
+                <p14:nvPr/>
+              </p14:nvContentPartPr>
+              <p14:xfrm>
+                <a:off x="2854819" y="3339758"/>
+                <a:ext cx="23400" cy="39960"/>
+              </p14:xfrm>
+            </p:contentPart>
+          </mc:Choice>
+          <mc:Fallback>
+            <p:pic>
+              <p:nvPicPr>
+                <p:cNvPr id="38" name="Ink 37">
+                  <a:extLst>
+                    <a:ext uri="{FF2B5EF4-FFF2-40B4-BE49-F238E27FC236}">
+                      <a16:creationId xmlns:a16="http://schemas.microsoft.com/office/drawing/2014/main" id="{7243E7C3-BCF1-0950-3E01-862EC79A4C63}"/>
+                    </a:ext>
+                  </a:extLst>
+                </p:cNvPr>
+                <p:cNvPicPr/>
+                <p:nvPr/>
+              </p:nvPicPr>
+              <p:blipFill>
+                <a:blip r:embed="rId4"/>
+                <a:stretch>
+                  <a:fillRect/>
+                </a:stretch>
+              </p:blipFill>
+              <p:spPr>
+                <a:xfrm>
+                  <a:off x="2845819" y="3330758"/>
+                  <a:ext cx="41040" cy="57600"/>
+                </a:xfrm>
+                <a:prstGeom prst="rect">
+                  <a:avLst/>
+                </a:prstGeom>
+              </p:spPr>
+            </p:pic>
+          </mc:Fallback>
+        </mc:AlternateContent>
+        <mc:AlternateContent xmlns:mc="http://schemas.openxmlformats.org/markup-compatibility/2006">
+          <mc:Choice xmlns:p14="http://schemas.microsoft.com/office/powerpoint/2010/main" Requires="p14">
+            <p:contentPart p14:bwMode="auto" r:id="rId5">
+              <p14:nvContentPartPr>
+                <p14:cNvPr id="39" name="Ink 38">
+                  <a:extLst>
+                    <a:ext uri="{FF2B5EF4-FFF2-40B4-BE49-F238E27FC236}">
+                      <a16:creationId xmlns:a16="http://schemas.microsoft.com/office/drawing/2014/main" id="{43D29B1C-14B6-21C4-DF04-14E7AAB0063F}"/>
+                    </a:ext>
+                  </a:extLst>
+                </p14:cNvPr>
+                <p14:cNvContentPartPr/>
+                <p14:nvPr/>
+              </p14:nvContentPartPr>
+              <p14:xfrm>
+                <a:off x="2791459" y="3435878"/>
+                <a:ext cx="38520" cy="48600"/>
+              </p14:xfrm>
+            </p:contentPart>
+          </mc:Choice>
+          <mc:Fallback>
+            <p:pic>
+              <p:nvPicPr>
+                <p:cNvPr id="39" name="Ink 38">
+                  <a:extLst>
+                    <a:ext uri="{FF2B5EF4-FFF2-40B4-BE49-F238E27FC236}">
+                      <a16:creationId xmlns:a16="http://schemas.microsoft.com/office/drawing/2014/main" id="{43D29B1C-14B6-21C4-DF04-14E7AAB0063F}"/>
+                    </a:ext>
+                  </a:extLst>
+                </p:cNvPr>
+                <p:cNvPicPr/>
+                <p:nvPr/>
+              </p:nvPicPr>
+              <p:blipFill>
+                <a:blip r:embed="rId6"/>
+                <a:stretch>
+                  <a:fillRect/>
+                </a:stretch>
+              </p:blipFill>
+              <p:spPr>
+                <a:xfrm>
+                  <a:off x="2782459" y="3427238"/>
+                  <a:ext cx="56160" cy="66240"/>
+                </a:xfrm>
+                <a:prstGeom prst="rect">
+                  <a:avLst/>
+                </a:prstGeom>
+              </p:spPr>
+            </p:pic>
+          </mc:Fallback>
+        </mc:AlternateContent>
+        <mc:AlternateContent xmlns:mc="http://schemas.openxmlformats.org/markup-compatibility/2006">
+          <mc:Choice xmlns:p14="http://schemas.microsoft.com/office/powerpoint/2010/main" Requires="p14">
+            <p:contentPart p14:bwMode="auto" r:id="rId7">
+              <p14:nvContentPartPr>
+                <p14:cNvPr id="40" name="Ink 39">
+                  <a:extLst>
+                    <a:ext uri="{FF2B5EF4-FFF2-40B4-BE49-F238E27FC236}">
+                      <a16:creationId xmlns:a16="http://schemas.microsoft.com/office/drawing/2014/main" id="{7788848C-EFC8-13BB-7779-978E6CD369C3}"/>
+                    </a:ext>
+                  </a:extLst>
+                </p14:cNvPr>
+                <p14:cNvContentPartPr/>
+                <p14:nvPr/>
+              </p14:nvContentPartPr>
+              <p14:xfrm>
+                <a:off x="2704699" y="3507878"/>
+                <a:ext cx="57960" cy="58680"/>
+              </p14:xfrm>
+            </p:contentPart>
+          </mc:Choice>
+          <mc:Fallback>
+            <p:pic>
+              <p:nvPicPr>
+                <p:cNvPr id="40" name="Ink 39">
+                  <a:extLst>
+                    <a:ext uri="{FF2B5EF4-FFF2-40B4-BE49-F238E27FC236}">
+                      <a16:creationId xmlns:a16="http://schemas.microsoft.com/office/drawing/2014/main" id="{7788848C-EFC8-13BB-7779-978E6CD369C3}"/>
+                    </a:ext>
+                  </a:extLst>
+                </p:cNvPr>
+                <p:cNvPicPr/>
+                <p:nvPr/>
+              </p:nvPicPr>
+              <p:blipFill>
+                <a:blip r:embed="rId8"/>
+                <a:stretch>
+                  <a:fillRect/>
+                </a:stretch>
+              </p:blipFill>
+              <p:spPr>
+                <a:xfrm>
+                  <a:off x="2696059" y="3499238"/>
+                  <a:ext cx="75600" cy="76320"/>
+                </a:xfrm>
+                <a:prstGeom prst="rect">
+                  <a:avLst/>
+                </a:prstGeom>
+              </p:spPr>
+            </p:pic>
+          </mc:Fallback>
+        </mc:AlternateContent>
+        <mc:AlternateContent xmlns:mc="http://schemas.openxmlformats.org/markup-compatibility/2006">
+          <mc:Choice xmlns:p14="http://schemas.microsoft.com/office/powerpoint/2010/main" Requires="p14">
+            <p:contentPart p14:bwMode="auto" r:id="rId9">
+              <p14:nvContentPartPr>
+                <p14:cNvPr id="42" name="Ink 41">
+                  <a:extLst>
+                    <a:ext uri="{FF2B5EF4-FFF2-40B4-BE49-F238E27FC236}">
+                      <a16:creationId xmlns:a16="http://schemas.microsoft.com/office/drawing/2014/main" id="{BE449B54-356C-E1C5-CE89-33E197FD8790}"/>
+                    </a:ext>
+                  </a:extLst>
+                </p14:cNvPr>
+                <p14:cNvContentPartPr/>
+                <p14:nvPr/>
+              </p14:nvContentPartPr>
+              <p14:xfrm>
+                <a:off x="2597419" y="3594638"/>
+                <a:ext cx="54720" cy="52200"/>
+              </p14:xfrm>
+            </p:contentPart>
+          </mc:Choice>
+          <mc:Fallback>
+            <p:pic>
+              <p:nvPicPr>
+                <p:cNvPr id="42" name="Ink 41">
+                  <a:extLst>
+                    <a:ext uri="{FF2B5EF4-FFF2-40B4-BE49-F238E27FC236}">
+                      <a16:creationId xmlns:a16="http://schemas.microsoft.com/office/drawing/2014/main" id="{BE449B54-356C-E1C5-CE89-33E197FD8790}"/>
+                    </a:ext>
+                  </a:extLst>
+                </p:cNvPr>
+                <p:cNvPicPr/>
+                <p:nvPr/>
+              </p:nvPicPr>
+              <p:blipFill>
+                <a:blip r:embed="rId10"/>
+                <a:stretch>
+                  <a:fillRect/>
+                </a:stretch>
+              </p:blipFill>
+              <p:spPr>
+                <a:xfrm>
+                  <a:off x="2588419" y="3585998"/>
+                  <a:ext cx="72360" cy="69840"/>
+                </a:xfrm>
+                <a:prstGeom prst="rect">
+                  <a:avLst/>
+                </a:prstGeom>
+              </p:spPr>
+            </p:pic>
+          </mc:Fallback>
+        </mc:AlternateContent>
+        <mc:AlternateContent xmlns:mc="http://schemas.openxmlformats.org/markup-compatibility/2006">
+          <mc:Choice xmlns:p14="http://schemas.microsoft.com/office/powerpoint/2010/main" Requires="p14">
+            <p:contentPart p14:bwMode="auto" r:id="rId11">
+              <p14:nvContentPartPr>
+                <p14:cNvPr id="43" name="Ink 42">
+                  <a:extLst>
+                    <a:ext uri="{FF2B5EF4-FFF2-40B4-BE49-F238E27FC236}">
+                      <a16:creationId xmlns:a16="http://schemas.microsoft.com/office/drawing/2014/main" id="{A973C8BF-DA4A-9985-FFCF-9C00048B7B20}"/>
+                    </a:ext>
+                  </a:extLst>
+                </p14:cNvPr>
+                <p14:cNvContentPartPr/>
+                <p14:nvPr/>
+              </p14:nvContentPartPr>
+              <p14:xfrm>
+                <a:off x="2507419" y="3681398"/>
+                <a:ext cx="43560" cy="43920"/>
+              </p14:xfrm>
+            </p:contentPart>
+          </mc:Choice>
+          <mc:Fallback>
+            <p:pic>
+              <p:nvPicPr>
+                <p:cNvPr id="43" name="Ink 42">
+                  <a:extLst>
+                    <a:ext uri="{FF2B5EF4-FFF2-40B4-BE49-F238E27FC236}">
+                      <a16:creationId xmlns:a16="http://schemas.microsoft.com/office/drawing/2014/main" id="{A973C8BF-DA4A-9985-FFCF-9C00048B7B20}"/>
+                    </a:ext>
+                  </a:extLst>
+                </p:cNvPr>
+                <p:cNvPicPr/>
+                <p:nvPr/>
+              </p:nvPicPr>
+              <p:blipFill>
+                <a:blip r:embed="rId12"/>
+                <a:stretch>
+                  <a:fillRect/>
+                </a:stretch>
+              </p:blipFill>
+              <p:spPr>
+                <a:xfrm>
+                  <a:off x="2498419" y="3672398"/>
+                  <a:ext cx="61200" cy="61560"/>
+                </a:xfrm>
+                <a:prstGeom prst="rect">
+                  <a:avLst/>
+                </a:prstGeom>
+              </p:spPr>
+            </p:pic>
+          </mc:Fallback>
+        </mc:AlternateContent>
+        <mc:AlternateContent xmlns:mc="http://schemas.openxmlformats.org/markup-compatibility/2006">
+          <mc:Choice xmlns:p14="http://schemas.microsoft.com/office/powerpoint/2010/main" Requires="p14">
+            <p:contentPart p14:bwMode="auto" r:id="rId13">
+              <p14:nvContentPartPr>
+                <p14:cNvPr id="45" name="Ink 44">
+                  <a:extLst>
+                    <a:ext uri="{FF2B5EF4-FFF2-40B4-BE49-F238E27FC236}">
+                      <a16:creationId xmlns:a16="http://schemas.microsoft.com/office/drawing/2014/main" id="{75FA5228-55A5-CAC4-A45B-D3DC90EA5B97}"/>
+                    </a:ext>
+                  </a:extLst>
+                </p14:cNvPr>
+                <p14:cNvContentPartPr/>
+                <p14:nvPr/>
+              </p14:nvContentPartPr>
+              <p14:xfrm>
+                <a:off x="2430019" y="3753398"/>
+                <a:ext cx="39240" cy="43560"/>
+              </p14:xfrm>
+            </p:contentPart>
+          </mc:Choice>
+          <mc:Fallback>
+            <p:pic>
+              <p:nvPicPr>
+                <p:cNvPr id="45" name="Ink 44">
+                  <a:extLst>
+                    <a:ext uri="{FF2B5EF4-FFF2-40B4-BE49-F238E27FC236}">
+                      <a16:creationId xmlns:a16="http://schemas.microsoft.com/office/drawing/2014/main" id="{75FA5228-55A5-CAC4-A45B-D3DC90EA5B97}"/>
+                    </a:ext>
+                  </a:extLst>
+                </p:cNvPr>
+                <p:cNvPicPr/>
+                <p:nvPr/>
+              </p:nvPicPr>
+              <p:blipFill>
+                <a:blip r:embed="rId14"/>
+                <a:stretch>
+                  <a:fillRect/>
+                </a:stretch>
+              </p:blipFill>
+              <p:spPr>
+                <a:xfrm>
+                  <a:off x="2421019" y="3744758"/>
+                  <a:ext cx="56880" cy="61200"/>
+                </a:xfrm>
+                <a:prstGeom prst="rect">
+                  <a:avLst/>
+                </a:prstGeom>
+              </p:spPr>
+            </p:pic>
+          </mc:Fallback>
+        </mc:AlternateContent>
+      </p:grpSp>
+      <p:grpSp>
+        <p:nvGrpSpPr>
+          <p:cNvPr id="55" name="Group 54">
+            <a:extLst>
+              <a:ext uri="{FF2B5EF4-FFF2-40B4-BE49-F238E27FC236}">
+                <a16:creationId xmlns:a16="http://schemas.microsoft.com/office/drawing/2014/main" id="{616EDDBF-893A-F5D4-672F-03BB2EA8E159}"/>
+              </a:ext>
+            </a:extLst>
+          </p:cNvPr>
+          <p:cNvGrpSpPr/>
+          <p:nvPr/>
+        </p:nvGrpSpPr>
+        <p:grpSpPr>
+          <a:xfrm>
+            <a:off x="2210059" y="3830438"/>
+            <a:ext cx="201240" cy="424440"/>
+            <a:chOff x="2210059" y="3830438"/>
+            <a:chExt cx="201240" cy="424440"/>
+          </a:xfrm>
+        </p:grpSpPr>
+        <mc:AlternateContent xmlns:mc="http://schemas.openxmlformats.org/markup-compatibility/2006">
+          <mc:Choice xmlns:p14="http://schemas.microsoft.com/office/powerpoint/2010/main" Requires="p14">
+            <p:contentPart p14:bwMode="auto" r:id="rId15">
+              <p14:nvContentPartPr>
+                <p14:cNvPr id="48" name="Ink 47">
+                  <a:extLst>
+                    <a:ext uri="{FF2B5EF4-FFF2-40B4-BE49-F238E27FC236}">
+                      <a16:creationId xmlns:a16="http://schemas.microsoft.com/office/drawing/2014/main" id="{133D17C6-08D1-64A0-0180-8E2C35AA5F14}"/>
+                    </a:ext>
+                  </a:extLst>
+                </p14:cNvPr>
+                <p14:cNvContentPartPr/>
+                <p14:nvPr/>
+              </p14:nvContentPartPr>
+              <p14:xfrm>
+                <a:off x="2368459" y="3830438"/>
+                <a:ext cx="42840" cy="55080"/>
+              </p14:xfrm>
+            </p:contentPart>
+          </mc:Choice>
+          <mc:Fallback>
+            <p:pic>
+              <p:nvPicPr>
+                <p:cNvPr id="48" name="Ink 47">
+                  <a:extLst>
+                    <a:ext uri="{FF2B5EF4-FFF2-40B4-BE49-F238E27FC236}">
+                      <a16:creationId xmlns:a16="http://schemas.microsoft.com/office/drawing/2014/main" id="{133D17C6-08D1-64A0-0180-8E2C35AA5F14}"/>
+                    </a:ext>
+                  </a:extLst>
+                </p:cNvPr>
+                <p:cNvPicPr/>
+                <p:nvPr/>
+              </p:nvPicPr>
+              <p:blipFill>
+                <a:blip r:embed="rId16"/>
+                <a:stretch>
+                  <a:fillRect/>
+                </a:stretch>
+              </p:blipFill>
+              <p:spPr>
+                <a:xfrm>
+                  <a:off x="2359819" y="3821798"/>
+                  <a:ext cx="60480" cy="72720"/>
+                </a:xfrm>
+                <a:prstGeom prst="rect">
+                  <a:avLst/>
+                </a:prstGeom>
+              </p:spPr>
+            </p:pic>
+          </mc:Fallback>
+        </mc:AlternateContent>
+        <mc:AlternateContent xmlns:mc="http://schemas.openxmlformats.org/markup-compatibility/2006">
+          <mc:Choice xmlns:p14="http://schemas.microsoft.com/office/powerpoint/2010/main" Requires="p14">
+            <p:contentPart p14:bwMode="auto" r:id="rId17">
+              <p14:nvContentPartPr>
+                <p14:cNvPr id="49" name="Ink 48">
+                  <a:extLst>
+                    <a:ext uri="{FF2B5EF4-FFF2-40B4-BE49-F238E27FC236}">
+                      <a16:creationId xmlns:a16="http://schemas.microsoft.com/office/drawing/2014/main" id="{C270BC0F-8FA1-CDB5-F40F-3F4A40CBEFA7}"/>
+                    </a:ext>
+                  </a:extLst>
+                </p14:cNvPr>
+                <p14:cNvContentPartPr/>
+                <p14:nvPr/>
+              </p14:nvContentPartPr>
+              <p14:xfrm>
+                <a:off x="2324899" y="3917198"/>
+                <a:ext cx="28440" cy="54360"/>
+              </p14:xfrm>
+            </p:contentPart>
+          </mc:Choice>
+          <mc:Fallback>
+            <p:pic>
+              <p:nvPicPr>
+                <p:cNvPr id="49" name="Ink 48">
+                  <a:extLst>
+                    <a:ext uri="{FF2B5EF4-FFF2-40B4-BE49-F238E27FC236}">
+                      <a16:creationId xmlns:a16="http://schemas.microsoft.com/office/drawing/2014/main" id="{C270BC0F-8FA1-CDB5-F40F-3F4A40CBEFA7}"/>
+                    </a:ext>
+                  </a:extLst>
+                </p:cNvPr>
+                <p:cNvPicPr/>
+                <p:nvPr/>
+              </p:nvPicPr>
+              <p:blipFill>
+                <a:blip r:embed="rId18"/>
+                <a:stretch>
+                  <a:fillRect/>
+                </a:stretch>
+              </p:blipFill>
+              <p:spPr>
+                <a:xfrm>
+                  <a:off x="2316259" y="3908558"/>
+                  <a:ext cx="46080" cy="72000"/>
+                </a:xfrm>
+                <a:prstGeom prst="rect">
+                  <a:avLst/>
+                </a:prstGeom>
+              </p:spPr>
+            </p:pic>
+          </mc:Fallback>
+        </mc:AlternateContent>
+        <mc:AlternateContent xmlns:mc="http://schemas.openxmlformats.org/markup-compatibility/2006">
+          <mc:Choice xmlns:p14="http://schemas.microsoft.com/office/powerpoint/2010/main" Requires="p14">
+            <p:contentPart p14:bwMode="auto" r:id="rId19">
+              <p14:nvContentPartPr>
+                <p14:cNvPr id="51" name="Ink 50">
+                  <a:extLst>
+                    <a:ext uri="{FF2B5EF4-FFF2-40B4-BE49-F238E27FC236}">
+                      <a16:creationId xmlns:a16="http://schemas.microsoft.com/office/drawing/2014/main" id="{408DA0BD-7158-9883-9E57-75582DE0DD00}"/>
+                    </a:ext>
+                  </a:extLst>
+                </p14:cNvPr>
+                <p14:cNvContentPartPr/>
+                <p14:nvPr/>
+              </p14:nvContentPartPr>
+              <p14:xfrm>
+                <a:off x="2281699" y="4008638"/>
+                <a:ext cx="23760" cy="54360"/>
+              </p14:xfrm>
+            </p:contentPart>
+          </mc:Choice>
+          <mc:Fallback>
+            <p:pic>
+              <p:nvPicPr>
+                <p:cNvPr id="51" name="Ink 50">
+                  <a:extLst>
+                    <a:ext uri="{FF2B5EF4-FFF2-40B4-BE49-F238E27FC236}">
+                      <a16:creationId xmlns:a16="http://schemas.microsoft.com/office/drawing/2014/main" id="{408DA0BD-7158-9883-9E57-75582DE0DD00}"/>
+                    </a:ext>
+                  </a:extLst>
+                </p:cNvPr>
+                <p:cNvPicPr/>
+                <p:nvPr/>
+              </p:nvPicPr>
+              <p:blipFill>
+                <a:blip r:embed="rId20"/>
+                <a:stretch>
+                  <a:fillRect/>
+                </a:stretch>
+              </p:blipFill>
+              <p:spPr>
+                <a:xfrm>
+                  <a:off x="2273059" y="3999638"/>
+                  <a:ext cx="41400" cy="72000"/>
+                </a:xfrm>
+                <a:prstGeom prst="rect">
+                  <a:avLst/>
+                </a:prstGeom>
+              </p:spPr>
+            </p:pic>
+          </mc:Fallback>
+        </mc:AlternateContent>
+        <mc:AlternateContent xmlns:mc="http://schemas.openxmlformats.org/markup-compatibility/2006">
+          <mc:Choice xmlns:p14="http://schemas.microsoft.com/office/powerpoint/2010/main" Requires="p14">
+            <p:contentPart p14:bwMode="auto" r:id="rId21">
+              <p14:nvContentPartPr>
+                <p14:cNvPr id="52" name="Ink 51">
+                  <a:extLst>
+                    <a:ext uri="{FF2B5EF4-FFF2-40B4-BE49-F238E27FC236}">
+                      <a16:creationId xmlns:a16="http://schemas.microsoft.com/office/drawing/2014/main" id="{3DD7DD95-B61A-08F5-61D8-56F0D6109DF1}"/>
+                    </a:ext>
+                  </a:extLst>
+                </p14:cNvPr>
+                <p14:cNvContentPartPr/>
+                <p14:nvPr/>
+              </p14:nvContentPartPr>
+              <p14:xfrm>
+                <a:off x="2246059" y="4095038"/>
+                <a:ext cx="30240" cy="57240"/>
+              </p14:xfrm>
+            </p:contentPart>
+          </mc:Choice>
+          <mc:Fallback>
+            <p:pic>
+              <p:nvPicPr>
+                <p:cNvPr id="52" name="Ink 51">
+                  <a:extLst>
+                    <a:ext uri="{FF2B5EF4-FFF2-40B4-BE49-F238E27FC236}">
+                      <a16:creationId xmlns:a16="http://schemas.microsoft.com/office/drawing/2014/main" id="{3DD7DD95-B61A-08F5-61D8-56F0D6109DF1}"/>
+                    </a:ext>
+                  </a:extLst>
+                </p:cNvPr>
+                <p:cNvPicPr/>
+                <p:nvPr/>
+              </p:nvPicPr>
+              <p:blipFill>
+                <a:blip r:embed="rId22"/>
+                <a:stretch>
+                  <a:fillRect/>
+                </a:stretch>
+              </p:blipFill>
+              <p:spPr>
+                <a:xfrm>
+                  <a:off x="2237419" y="4086398"/>
+                  <a:ext cx="47880" cy="74880"/>
+                </a:xfrm>
+                <a:prstGeom prst="rect">
+                  <a:avLst/>
+                </a:prstGeom>
+              </p:spPr>
+            </p:pic>
+          </mc:Fallback>
+        </mc:AlternateContent>
+        <mc:AlternateContent xmlns:mc="http://schemas.openxmlformats.org/markup-compatibility/2006">
+          <mc:Choice xmlns:p14="http://schemas.microsoft.com/office/powerpoint/2010/main" Requires="p14">
+            <p:contentPart p14:bwMode="auto" r:id="rId23">
+              <p14:nvContentPartPr>
+                <p14:cNvPr id="54" name="Ink 53">
+                  <a:extLst>
+                    <a:ext uri="{FF2B5EF4-FFF2-40B4-BE49-F238E27FC236}">
+                      <a16:creationId xmlns:a16="http://schemas.microsoft.com/office/drawing/2014/main" id="{87D235CA-57DB-44BC-C38C-ED8CEA08BBF8}"/>
+                    </a:ext>
+                  </a:extLst>
+                </p14:cNvPr>
+                <p14:cNvContentPartPr/>
+                <p14:nvPr/>
+              </p14:nvContentPartPr>
+              <p14:xfrm>
+                <a:off x="2210059" y="4186838"/>
+                <a:ext cx="33120" cy="68040"/>
+              </p14:xfrm>
+            </p:contentPart>
+          </mc:Choice>
+          <mc:Fallback>
+            <p:pic>
+              <p:nvPicPr>
+                <p:cNvPr id="54" name="Ink 53">
+                  <a:extLst>
+                    <a:ext uri="{FF2B5EF4-FFF2-40B4-BE49-F238E27FC236}">
+                      <a16:creationId xmlns:a16="http://schemas.microsoft.com/office/drawing/2014/main" id="{87D235CA-57DB-44BC-C38C-ED8CEA08BBF8}"/>
+                    </a:ext>
+                  </a:extLst>
+                </p:cNvPr>
+                <p:cNvPicPr/>
+                <p:nvPr/>
+              </p:nvPicPr>
+              <p:blipFill>
+                <a:blip r:embed="rId24"/>
+                <a:stretch>
+                  <a:fillRect/>
+                </a:stretch>
+              </p:blipFill>
+              <p:spPr>
+                <a:xfrm>
+                  <a:off x="2201059" y="4177838"/>
+                  <a:ext cx="50760" cy="85680"/>
+                </a:xfrm>
+                <a:prstGeom prst="rect">
+                  <a:avLst/>
+                </a:prstGeom>
+              </p:spPr>
+            </p:pic>
+          </mc:Fallback>
+        </mc:AlternateContent>
+      </p:grpSp>
+      <mc:AlternateContent xmlns:mc="http://schemas.openxmlformats.org/markup-compatibility/2006">
+        <mc:Choice xmlns:p14="http://schemas.microsoft.com/office/powerpoint/2010/main" Requires="p14">
+          <p:contentPart p14:bwMode="auto" r:id="rId25">
+            <p14:nvContentPartPr>
+              <p14:cNvPr id="56" name="Ink 55">
+                <a:extLst>
+                  <a:ext uri="{FF2B5EF4-FFF2-40B4-BE49-F238E27FC236}">
+                    <a16:creationId xmlns:a16="http://schemas.microsoft.com/office/drawing/2014/main" id="{6A62ADA0-36CF-9108-8CD3-AD33A147967F}"/>
+                  </a:ext>
+                </a:extLst>
+              </p14:cNvPr>
+              <p14:cNvContentPartPr/>
+              <p14:nvPr/>
+            </p14:nvContentPartPr>
+            <p14:xfrm>
+              <a:off x="2171899" y="4287638"/>
+              <a:ext cx="27360" cy="86400"/>
+            </p14:xfrm>
+          </p:contentPart>
+        </mc:Choice>
+        <mc:Fallback>
+          <p:pic>
+            <p:nvPicPr>
+              <p:cNvPr id="56" name="Ink 55">
+                <a:extLst>
+                  <a:ext uri="{FF2B5EF4-FFF2-40B4-BE49-F238E27FC236}">
+                    <a16:creationId xmlns:a16="http://schemas.microsoft.com/office/drawing/2014/main" id="{6A62ADA0-36CF-9108-8CD3-AD33A147967F}"/>
+                  </a:ext>
+                </a:extLst>
+              </p:cNvPr>
+              <p:cNvPicPr/>
+              <p:nvPr/>
+            </p:nvPicPr>
+            <p:blipFill>
+              <a:blip r:embed="rId26"/>
+              <a:stretch>
+                <a:fillRect/>
+              </a:stretch>
+            </p:blipFill>
+            <p:spPr>
+              <a:xfrm>
+                <a:off x="2163259" y="4278998"/>
+                <a:ext cx="45000" cy="104040"/>
+              </a:xfrm>
+              <a:prstGeom prst="rect">
+                <a:avLst/>
+              </a:prstGeom>
+            </p:spPr>
+          </p:pic>
+        </mc:Fallback>
+      </mc:AlternateContent>
+      <p:cxnSp>
+        <p:nvCxnSpPr>
+          <p:cNvPr id="57" name="Straight Connector 56">
+            <a:extLst>
+              <a:ext uri="{FF2B5EF4-FFF2-40B4-BE49-F238E27FC236}">
+                <a16:creationId xmlns:a16="http://schemas.microsoft.com/office/drawing/2014/main" id="{E9252809-AFD7-9F10-EDDA-D2BC9641EF78}"/>
+              </a:ext>
+            </a:extLst>
+          </p:cNvPr>
+          <p:cNvCxnSpPr>
+            <a:cxnSpLocks/>
+          </p:cNvCxnSpPr>
+          <p:nvPr/>
+        </p:nvCxnSpPr>
+        <p:spPr>
+          <a:xfrm>
+            <a:off x="3873199" y="2162182"/>
+            <a:ext cx="124643" cy="1375036"/>
+          </a:xfrm>
+          <a:prstGeom prst="line">
+            <a:avLst/>
+          </a:prstGeom>
+          <a:ln w="19050">
+            <a:solidFill>
+              <a:srgbClr val="41EBFD"/>
+            </a:solidFill>
+          </a:ln>
+        </p:spPr>
+        <p:style>
+          <a:lnRef idx="1">
+            <a:schemeClr val="accent1"/>
+          </a:lnRef>
+          <a:fillRef idx="0">
+            <a:schemeClr val="accent1"/>
+          </a:fillRef>
+          <a:effectRef idx="0">
+            <a:schemeClr val="accent1"/>
+          </a:effectRef>
+          <a:fontRef idx="minor">
+            <a:schemeClr val="tx1"/>
+          </a:fontRef>
+        </p:style>
+      </p:cxnSp>
+      <p:sp>
+        <p:nvSpPr>
+          <p:cNvPr id="60" name="TextBox 59">
+            <a:extLst>
+              <a:ext uri="{FF2B5EF4-FFF2-40B4-BE49-F238E27FC236}">
+                <a16:creationId xmlns:a16="http://schemas.microsoft.com/office/drawing/2014/main" id="{8A66EA2F-B262-5280-EF2F-DFF0150C4062}"/>
+              </a:ext>
+            </a:extLst>
+          </p:cNvPr>
+          <p:cNvSpPr txBox="1"/>
+          <p:nvPr/>
+        </p:nvSpPr>
+        <p:spPr>
+          <a:xfrm>
+            <a:off x="3970664" y="2810810"/>
+            <a:ext cx="45719" cy="477054"/>
+          </a:xfrm>
+          <a:prstGeom prst="rect">
+            <a:avLst/>
+          </a:prstGeom>
+          <a:noFill/>
+        </p:spPr>
+        <p:txBody>
+          <a:bodyPr wrap="square" rtlCol="0">
+            <a:spAutoFit/>
+          </a:bodyPr>
+          <a:lstStyle/>
+          <a:p>
+            <a:r>
+              <a:rPr lang="en-US" sz="2500" b="1" dirty="0">
+                <a:solidFill>
+                  <a:srgbClr val="41EBFD"/>
+                </a:solidFill>
+                <a:latin typeface="Bradley Hand ITC" panose="03070402050302030203" pitchFamily="66" charset="0"/>
+                <a:cs typeface="Arial" panose="020B0604020202020204" pitchFamily="34" charset="0"/>
+              </a:rPr>
+              <a:t>i</a:t>
+            </a:r>
+          </a:p>
+        </p:txBody>
+      </p:sp>
+      <p:cxnSp>
+        <p:nvCxnSpPr>
+          <p:cNvPr id="61" name="Straight Connector 60">
+            <a:extLst>
+              <a:ext uri="{FF2B5EF4-FFF2-40B4-BE49-F238E27FC236}">
+                <a16:creationId xmlns:a16="http://schemas.microsoft.com/office/drawing/2014/main" id="{BAA3A9A2-CC13-2F66-9795-1905130AA83E}"/>
+              </a:ext>
+            </a:extLst>
+          </p:cNvPr>
+          <p:cNvCxnSpPr>
+            <a:cxnSpLocks/>
+          </p:cNvCxnSpPr>
+          <p:nvPr/>
+        </p:nvCxnSpPr>
+        <p:spPr>
+          <a:xfrm flipV="1">
+            <a:off x="3324447" y="2621970"/>
+            <a:ext cx="1190846" cy="99965"/>
+          </a:xfrm>
+          <a:prstGeom prst="line">
+            <a:avLst/>
+          </a:prstGeom>
+          <a:ln w="19050">
+            <a:solidFill>
+              <a:srgbClr val="019FAB"/>
+            </a:solidFill>
+          </a:ln>
+        </p:spPr>
+        <p:style>
+          <a:lnRef idx="1">
+            <a:schemeClr val="accent1"/>
+          </a:lnRef>
+          <a:fillRef idx="0">
+            <a:schemeClr val="accent1"/>
+          </a:fillRef>
+          <a:effectRef idx="0">
+            <a:schemeClr val="accent1"/>
+          </a:effectRef>
+          <a:fontRef idx="minor">
+            <a:schemeClr val="tx1"/>
+          </a:fontRef>
+        </p:style>
+      </p:cxnSp>
+      <p:sp>
+        <p:nvSpPr>
+          <p:cNvPr id="70" name="TextBox 69">
+            <a:extLst>
+              <a:ext uri="{FF2B5EF4-FFF2-40B4-BE49-F238E27FC236}">
+                <a16:creationId xmlns:a16="http://schemas.microsoft.com/office/drawing/2014/main" id="{D9047455-0F0F-1285-8C26-5278FA6BDD36}"/>
+              </a:ext>
+            </a:extLst>
+          </p:cNvPr>
+          <p:cNvSpPr txBox="1"/>
+          <p:nvPr/>
+        </p:nvSpPr>
+        <p:spPr>
+          <a:xfrm>
+            <a:off x="3525292" y="2253164"/>
+            <a:ext cx="45719" cy="477054"/>
+          </a:xfrm>
+          <a:prstGeom prst="rect">
+            <a:avLst/>
+          </a:prstGeom>
+          <a:noFill/>
+        </p:spPr>
+        <p:txBody>
+          <a:bodyPr wrap="square" rtlCol="0">
+            <a:spAutoFit/>
+          </a:bodyPr>
+          <a:lstStyle/>
+          <a:p>
+            <a:r>
+              <a:rPr lang="en-US" sz="2500" b="1" dirty="0">
+                <a:solidFill>
+                  <a:srgbClr val="019FAB"/>
+                </a:solidFill>
+                <a:latin typeface="Bradley Hand ITC" panose="03070402050302030203" pitchFamily="66" charset="0"/>
+                <a:cs typeface="Arial" panose="020B0604020202020204" pitchFamily="34" charset="0"/>
+              </a:rPr>
+              <a:t>h</a:t>
+            </a:r>
+          </a:p>
+        </p:txBody>
+      </p:sp>
+      <p:sp>
+        <p:nvSpPr>
+          <p:cNvPr id="71" name="TextBox 70">
+            <a:extLst>
+              <a:ext uri="{FF2B5EF4-FFF2-40B4-BE49-F238E27FC236}">
+                <a16:creationId xmlns:a16="http://schemas.microsoft.com/office/drawing/2014/main" id="{4380F16A-A1EC-AD7A-501A-5D771D7A5CA0}"/>
+              </a:ext>
+            </a:extLst>
+          </p:cNvPr>
+          <p:cNvSpPr txBox="1"/>
+          <p:nvPr/>
+        </p:nvSpPr>
+        <p:spPr>
+          <a:xfrm>
+            <a:off x="7837371" y="2810810"/>
+            <a:ext cx="45719" cy="477054"/>
+          </a:xfrm>
+          <a:prstGeom prst="rect">
+            <a:avLst/>
+          </a:prstGeom>
+          <a:noFill/>
+        </p:spPr>
+        <p:txBody>
+          <a:bodyPr wrap="square" rtlCol="0">
+            <a:spAutoFit/>
+          </a:bodyPr>
+          <a:lstStyle/>
+          <a:p>
+            <a:r>
+              <a:rPr lang="en-US" sz="2500" b="1" dirty="0">
+                <a:solidFill>
+                  <a:srgbClr val="7030A0"/>
+                </a:solidFill>
+                <a:latin typeface="Bradley Hand ITC" panose="03070402050302030203" pitchFamily="66" charset="0"/>
+                <a:cs typeface="Arial" panose="020B0604020202020204" pitchFamily="34" charset="0"/>
+              </a:rPr>
+              <a:t>l</a:t>
+            </a:r>
+          </a:p>
+        </p:txBody>
+      </p:sp>
+      <p:cxnSp>
+        <p:nvCxnSpPr>
+          <p:cNvPr id="72" name="Straight Connector 71">
+            <a:extLst>
+              <a:ext uri="{FF2B5EF4-FFF2-40B4-BE49-F238E27FC236}">
+                <a16:creationId xmlns:a16="http://schemas.microsoft.com/office/drawing/2014/main" id="{645936BF-4107-9628-E820-13518BC505C4}"/>
+              </a:ext>
+            </a:extLst>
+          </p:cNvPr>
+          <p:cNvCxnSpPr>
+            <a:cxnSpLocks/>
+          </p:cNvCxnSpPr>
+          <p:nvPr/>
+        </p:nvCxnSpPr>
+        <p:spPr>
+          <a:xfrm>
+            <a:off x="4497563" y="2721935"/>
+            <a:ext cx="3973042" cy="174327"/>
+          </a:xfrm>
+          <a:prstGeom prst="line">
+            <a:avLst/>
+          </a:prstGeom>
+          <a:ln w="19050">
+            <a:solidFill>
+              <a:srgbClr val="C00000"/>
+            </a:solidFill>
+          </a:ln>
+        </p:spPr>
+        <p:style>
+          <a:lnRef idx="1">
+            <a:schemeClr val="accent1"/>
+          </a:lnRef>
+          <a:fillRef idx="0">
+            <a:schemeClr val="accent1"/>
+          </a:fillRef>
+          <a:effectRef idx="0">
+            <a:schemeClr val="accent1"/>
+          </a:effectRef>
+          <a:fontRef idx="minor">
+            <a:schemeClr val="tx1"/>
+          </a:fontRef>
+        </p:style>
+      </p:cxnSp>
+      <p:sp>
+        <p:nvSpPr>
+          <p:cNvPr id="78" name="TextBox 77">
+            <a:extLst>
+              <a:ext uri="{FF2B5EF4-FFF2-40B4-BE49-F238E27FC236}">
+                <a16:creationId xmlns:a16="http://schemas.microsoft.com/office/drawing/2014/main" id="{5C6AC23F-9679-F6BF-B4E2-3C5093DBCA1D}"/>
+              </a:ext>
+            </a:extLst>
+          </p:cNvPr>
+          <p:cNvSpPr txBox="1"/>
+          <p:nvPr/>
+        </p:nvSpPr>
+        <p:spPr>
+          <a:xfrm>
+            <a:off x="5850558" y="2319506"/>
+            <a:ext cx="45719" cy="477054"/>
+          </a:xfrm>
+          <a:prstGeom prst="rect">
+            <a:avLst/>
+          </a:prstGeom>
+          <a:noFill/>
+        </p:spPr>
+        <p:txBody>
+          <a:bodyPr wrap="square" rtlCol="0">
+            <a:spAutoFit/>
+          </a:bodyPr>
+          <a:lstStyle/>
+          <a:p>
+            <a:r>
+              <a:rPr lang="en-US" sz="2500" b="1" dirty="0">
+                <a:solidFill>
+                  <a:srgbClr val="C00000"/>
+                </a:solidFill>
+                <a:latin typeface="Bradley Hand ITC" panose="03070402050302030203" pitchFamily="66" charset="0"/>
+                <a:cs typeface="Arial" panose="020B0604020202020204" pitchFamily="34" charset="0"/>
+              </a:rPr>
+              <a:t>j</a:t>
+            </a:r>
+          </a:p>
+        </p:txBody>
+      </p:sp>
+      <p:sp>
+        <p:nvSpPr>
+          <p:cNvPr id="79" name="TextBox 78">
+            <a:extLst>
+              <a:ext uri="{FF2B5EF4-FFF2-40B4-BE49-F238E27FC236}">
+                <a16:creationId xmlns:a16="http://schemas.microsoft.com/office/drawing/2014/main" id="{C5237BC1-9C0A-962A-D2F5-2D9A484C08FD}"/>
+              </a:ext>
+            </a:extLst>
+          </p:cNvPr>
+          <p:cNvSpPr txBox="1"/>
+          <p:nvPr/>
+        </p:nvSpPr>
+        <p:spPr>
+          <a:xfrm>
+            <a:off x="6142046" y="3086630"/>
+            <a:ext cx="45719" cy="477054"/>
+          </a:xfrm>
+          <a:prstGeom prst="rect">
+            <a:avLst/>
+          </a:prstGeom>
+          <a:noFill/>
+        </p:spPr>
+        <p:txBody>
+          <a:bodyPr wrap="square" rtlCol="0">
+            <a:spAutoFit/>
+          </a:bodyPr>
+          <a:lstStyle/>
+          <a:p>
+            <a:r>
+              <a:rPr lang="en-US" sz="2500" b="1" dirty="0">
+                <a:solidFill>
+                  <a:srgbClr val="EA1AC7"/>
+                </a:solidFill>
+                <a:latin typeface="Bradley Hand ITC" panose="03070402050302030203" pitchFamily="66" charset="0"/>
+                <a:cs typeface="Arial" panose="020B0604020202020204" pitchFamily="34" charset="0"/>
+              </a:rPr>
+              <a:t>k</a:t>
+            </a:r>
+          </a:p>
+        </p:txBody>
+      </p:sp>
+      <p:cxnSp>
+        <p:nvCxnSpPr>
+          <p:cNvPr id="80" name="Straight Connector 79">
+            <a:extLst>
+              <a:ext uri="{FF2B5EF4-FFF2-40B4-BE49-F238E27FC236}">
+                <a16:creationId xmlns:a16="http://schemas.microsoft.com/office/drawing/2014/main" id="{3DF12BE6-8BAE-3D4B-F047-F89F3457D69A}"/>
+              </a:ext>
+            </a:extLst>
+          </p:cNvPr>
+          <p:cNvCxnSpPr>
+            <a:cxnSpLocks/>
+          </p:cNvCxnSpPr>
+          <p:nvPr/>
+        </p:nvCxnSpPr>
+        <p:spPr>
+          <a:xfrm flipV="1">
+            <a:off x="3283500" y="3271338"/>
+            <a:ext cx="403801" cy="559100"/>
+          </a:xfrm>
+          <a:prstGeom prst="line">
+            <a:avLst/>
+          </a:prstGeom>
+          <a:ln w="19050">
+            <a:solidFill>
+              <a:schemeClr val="accent6">
+                <a:lumMod val="50000"/>
+              </a:schemeClr>
+            </a:solidFill>
+          </a:ln>
+        </p:spPr>
+        <p:style>
+          <a:lnRef idx="1">
+            <a:schemeClr val="accent1"/>
+          </a:lnRef>
+          <a:fillRef idx="0">
+            <a:schemeClr val="accent1"/>
+          </a:fillRef>
+          <a:effectRef idx="0">
+            <a:schemeClr val="accent1"/>
+          </a:effectRef>
+          <a:fontRef idx="minor">
+            <a:schemeClr val="tx1"/>
+          </a:fontRef>
+        </p:style>
+      </p:cxnSp>
+      <p:cxnSp>
+        <p:nvCxnSpPr>
+          <p:cNvPr id="83" name="Straight Connector 82">
+            <a:extLst>
+              <a:ext uri="{FF2B5EF4-FFF2-40B4-BE49-F238E27FC236}">
+                <a16:creationId xmlns:a16="http://schemas.microsoft.com/office/drawing/2014/main" id="{C2D09BB4-0B0F-96A1-74BB-5DE331078DA7}"/>
+              </a:ext>
+            </a:extLst>
+          </p:cNvPr>
+          <p:cNvCxnSpPr>
+            <a:cxnSpLocks/>
+          </p:cNvCxnSpPr>
+          <p:nvPr/>
+        </p:nvCxnSpPr>
+        <p:spPr>
+          <a:xfrm flipV="1">
+            <a:off x="2584115" y="3837267"/>
+            <a:ext cx="699385" cy="731414"/>
+          </a:xfrm>
+          <a:prstGeom prst="line">
+            <a:avLst/>
+          </a:prstGeom>
+          <a:ln w="19050">
+            <a:solidFill>
+              <a:schemeClr val="accent6">
+                <a:lumMod val="50000"/>
+              </a:schemeClr>
+            </a:solidFill>
+          </a:ln>
+        </p:spPr>
+        <p:style>
+          <a:lnRef idx="1">
+            <a:schemeClr val="accent1"/>
+          </a:lnRef>
+          <a:fillRef idx="0">
+            <a:schemeClr val="accent1"/>
+          </a:fillRef>
+          <a:effectRef idx="0">
+            <a:schemeClr val="accent1"/>
+          </a:effectRef>
+          <a:fontRef idx="minor">
+            <a:schemeClr val="tx1"/>
+          </a:fontRef>
+        </p:style>
+      </p:cxnSp>
+      <p:cxnSp>
+        <p:nvCxnSpPr>
+          <p:cNvPr id="86" name="Straight Connector 85">
+            <a:extLst>
+              <a:ext uri="{FF2B5EF4-FFF2-40B4-BE49-F238E27FC236}">
+                <a16:creationId xmlns:a16="http://schemas.microsoft.com/office/drawing/2014/main" id="{68EA6B0C-1EEF-A6A4-970D-0FCD87C5711E}"/>
+              </a:ext>
+            </a:extLst>
+          </p:cNvPr>
+          <p:cNvCxnSpPr>
+            <a:cxnSpLocks/>
+          </p:cNvCxnSpPr>
+          <p:nvPr/>
+        </p:nvCxnSpPr>
+        <p:spPr>
+          <a:xfrm flipV="1">
+            <a:off x="2060658" y="4568681"/>
+            <a:ext cx="523457" cy="627618"/>
+          </a:xfrm>
+          <a:prstGeom prst="line">
+            <a:avLst/>
+          </a:prstGeom>
+          <a:ln w="19050">
+            <a:solidFill>
+              <a:schemeClr val="accent6">
+                <a:lumMod val="50000"/>
+              </a:schemeClr>
+            </a:solidFill>
+          </a:ln>
+        </p:spPr>
+        <p:style>
+          <a:lnRef idx="1">
+            <a:schemeClr val="accent1"/>
+          </a:lnRef>
+          <a:fillRef idx="0">
+            <a:schemeClr val="accent1"/>
+          </a:fillRef>
+          <a:effectRef idx="0">
+            <a:schemeClr val="accent1"/>
+          </a:effectRef>
+          <a:fontRef idx="minor">
+            <a:schemeClr val="tx1"/>
+          </a:fontRef>
+        </p:style>
+      </p:cxnSp>
+      <p:sp>
+        <p:nvSpPr>
+          <p:cNvPr id="89" name="TextBox 88">
+            <a:extLst>
+              <a:ext uri="{FF2B5EF4-FFF2-40B4-BE49-F238E27FC236}">
+                <a16:creationId xmlns:a16="http://schemas.microsoft.com/office/drawing/2014/main" id="{DB7ADC92-FA49-279F-4195-6688EBD39636}"/>
+              </a:ext>
+            </a:extLst>
+          </p:cNvPr>
+          <p:cNvSpPr txBox="1"/>
+          <p:nvPr/>
+        </p:nvSpPr>
+        <p:spPr>
+          <a:xfrm>
+            <a:off x="3301587" y="3743804"/>
+            <a:ext cx="45719" cy="477054"/>
+          </a:xfrm>
+          <a:prstGeom prst="rect">
+            <a:avLst/>
+          </a:prstGeom>
+          <a:noFill/>
+        </p:spPr>
+        <p:txBody>
+          <a:bodyPr wrap="square" rtlCol="0">
+            <a:spAutoFit/>
+          </a:bodyPr>
+          <a:lstStyle/>
+          <a:p>
+            <a:r>
+              <a:rPr lang="en-US" sz="2500" b="1" dirty="0">
+                <a:solidFill>
+                  <a:schemeClr val="accent6">
+                    <a:lumMod val="50000"/>
+                  </a:schemeClr>
+                </a:solidFill>
+                <a:latin typeface="Bradley Hand ITC" panose="03070402050302030203" pitchFamily="66" charset="0"/>
+                <a:cs typeface="Arial" panose="020B0604020202020204" pitchFamily="34" charset="0"/>
+              </a:rPr>
+              <a:t>c</a:t>
+            </a:r>
+          </a:p>
+        </p:txBody>
+      </p:sp>
+      <p:cxnSp>
+        <p:nvCxnSpPr>
+          <p:cNvPr id="90" name="Straight Connector 89">
+            <a:extLst>
+              <a:ext uri="{FF2B5EF4-FFF2-40B4-BE49-F238E27FC236}">
+                <a16:creationId xmlns:a16="http://schemas.microsoft.com/office/drawing/2014/main" id="{6550DEA0-900B-9585-3CD6-CE778E09FE3C}"/>
+              </a:ext>
+            </a:extLst>
+          </p:cNvPr>
+          <p:cNvCxnSpPr>
+            <a:cxnSpLocks/>
+          </p:cNvCxnSpPr>
+          <p:nvPr/>
+        </p:nvCxnSpPr>
+        <p:spPr>
+          <a:xfrm>
+            <a:off x="6393086" y="2041823"/>
+            <a:ext cx="0" cy="1733355"/>
+          </a:xfrm>
+          <a:prstGeom prst="line">
+            <a:avLst/>
+          </a:prstGeom>
+          <a:ln w="19050">
+            <a:solidFill>
+              <a:srgbClr val="EA1AC7"/>
+            </a:solidFill>
+          </a:ln>
+        </p:spPr>
+        <p:style>
+          <a:lnRef idx="1">
+            <a:schemeClr val="accent1"/>
+          </a:lnRef>
+          <a:fillRef idx="0">
+            <a:schemeClr val="accent1"/>
+          </a:fillRef>
+          <a:effectRef idx="0">
+            <a:schemeClr val="accent1"/>
+          </a:effectRef>
+          <a:fontRef idx="minor">
+            <a:schemeClr val="tx1"/>
+          </a:fontRef>
+        </p:style>
+      </p:cxnSp>
+      <p:cxnSp>
+        <p:nvCxnSpPr>
+          <p:cNvPr id="93" name="Straight Connector 92">
+            <a:extLst>
+              <a:ext uri="{FF2B5EF4-FFF2-40B4-BE49-F238E27FC236}">
+                <a16:creationId xmlns:a16="http://schemas.microsoft.com/office/drawing/2014/main" id="{CAE762B6-A4FC-C3D3-F85A-331066FED5AE}"/>
+              </a:ext>
+            </a:extLst>
+          </p:cNvPr>
+          <p:cNvCxnSpPr>
+            <a:cxnSpLocks/>
+          </p:cNvCxnSpPr>
+          <p:nvPr/>
+        </p:nvCxnSpPr>
+        <p:spPr>
+          <a:xfrm flipH="1" flipV="1">
+            <a:off x="6846958" y="3490930"/>
+            <a:ext cx="780130" cy="883108"/>
+          </a:xfrm>
+          <a:prstGeom prst="line">
+            <a:avLst/>
+          </a:prstGeom>
+          <a:ln w="19050">
+            <a:solidFill>
+              <a:srgbClr val="92D050"/>
+            </a:solidFill>
+          </a:ln>
+        </p:spPr>
+        <p:style>
+          <a:lnRef idx="1">
+            <a:schemeClr val="accent1"/>
+          </a:lnRef>
+          <a:fillRef idx="0">
+            <a:schemeClr val="accent1"/>
+          </a:fillRef>
+          <a:effectRef idx="0">
+            <a:schemeClr val="accent1"/>
+          </a:effectRef>
+          <a:fontRef idx="minor">
+            <a:schemeClr val="tx1"/>
+          </a:fontRef>
+        </p:style>
+      </p:cxnSp>
+      <p:cxnSp>
+        <p:nvCxnSpPr>
+          <p:cNvPr id="97" name="Straight Connector 96">
+            <a:extLst>
+              <a:ext uri="{FF2B5EF4-FFF2-40B4-BE49-F238E27FC236}">
+                <a16:creationId xmlns:a16="http://schemas.microsoft.com/office/drawing/2014/main" id="{82484DBB-1A99-2B0C-95DB-2BCBC6B32B09}"/>
+              </a:ext>
+            </a:extLst>
+          </p:cNvPr>
+          <p:cNvCxnSpPr>
+            <a:cxnSpLocks/>
+          </p:cNvCxnSpPr>
+          <p:nvPr/>
+        </p:nvCxnSpPr>
+        <p:spPr>
+          <a:xfrm flipH="1" flipV="1">
+            <a:off x="7627088" y="4354614"/>
+            <a:ext cx="1162493" cy="614092"/>
+          </a:xfrm>
+          <a:prstGeom prst="line">
+            <a:avLst/>
+          </a:prstGeom>
+          <a:ln w="19050">
+            <a:solidFill>
+              <a:srgbClr val="92D050"/>
+            </a:solidFill>
+          </a:ln>
+        </p:spPr>
+        <p:style>
+          <a:lnRef idx="1">
+            <a:schemeClr val="accent1"/>
+          </a:lnRef>
+          <a:fillRef idx="0">
+            <a:schemeClr val="accent1"/>
+          </a:fillRef>
+          <a:effectRef idx="0">
+            <a:schemeClr val="accent1"/>
+          </a:effectRef>
+          <a:fontRef idx="minor">
+            <a:schemeClr val="tx1"/>
+          </a:fontRef>
+        </p:style>
+      </p:cxnSp>
+      <p:cxnSp>
+        <p:nvCxnSpPr>
+          <p:cNvPr id="99" name="Straight Connector 98">
+            <a:extLst>
+              <a:ext uri="{FF2B5EF4-FFF2-40B4-BE49-F238E27FC236}">
+                <a16:creationId xmlns:a16="http://schemas.microsoft.com/office/drawing/2014/main" id="{12CCD434-0BAB-7FF0-FD74-F03163E4D229}"/>
+              </a:ext>
+            </a:extLst>
+          </p:cNvPr>
+          <p:cNvCxnSpPr>
+            <a:cxnSpLocks/>
+          </p:cNvCxnSpPr>
+          <p:nvPr/>
+        </p:nvCxnSpPr>
+        <p:spPr>
+          <a:xfrm flipH="1" flipV="1">
+            <a:off x="8789581" y="4968706"/>
+            <a:ext cx="1049079" cy="716168"/>
+          </a:xfrm>
+          <a:prstGeom prst="line">
+            <a:avLst/>
+          </a:prstGeom>
+          <a:ln w="19050">
+            <a:solidFill>
+              <a:srgbClr val="92D050"/>
+            </a:solidFill>
+          </a:ln>
+        </p:spPr>
+        <p:style>
+          <a:lnRef idx="1">
+            <a:schemeClr val="accent1"/>
+          </a:lnRef>
+          <a:fillRef idx="0">
+            <a:schemeClr val="accent1"/>
+          </a:fillRef>
+          <a:effectRef idx="0">
+            <a:schemeClr val="accent1"/>
+          </a:effectRef>
+          <a:fontRef idx="minor">
+            <a:schemeClr val="tx1"/>
+          </a:fontRef>
+        </p:style>
+      </p:cxnSp>
+      <p:sp>
+        <p:nvSpPr>
+          <p:cNvPr id="101" name="TextBox 100">
+            <a:extLst>
+              <a:ext uri="{FF2B5EF4-FFF2-40B4-BE49-F238E27FC236}">
+                <a16:creationId xmlns:a16="http://schemas.microsoft.com/office/drawing/2014/main" id="{6C300178-5A8A-BF62-3FB8-DC60913A29B3}"/>
+              </a:ext>
+            </a:extLst>
+          </p:cNvPr>
+          <p:cNvSpPr txBox="1"/>
+          <p:nvPr/>
+        </p:nvSpPr>
+        <p:spPr>
+          <a:xfrm>
+            <a:off x="7791652" y="4062998"/>
+            <a:ext cx="45719" cy="477054"/>
+          </a:xfrm>
+          <a:prstGeom prst="rect">
+            <a:avLst/>
+          </a:prstGeom>
+          <a:noFill/>
+        </p:spPr>
+        <p:txBody>
+          <a:bodyPr wrap="square" rtlCol="0">
+            <a:spAutoFit/>
+          </a:bodyPr>
+          <a:lstStyle/>
+          <a:p>
+            <a:r>
+              <a:rPr lang="en-US" sz="2500" b="1" dirty="0">
+                <a:solidFill>
+                  <a:srgbClr val="92D050"/>
+                </a:solidFill>
+                <a:latin typeface="Bradley Hand ITC" panose="03070402050302030203" pitchFamily="66" charset="0"/>
+                <a:cs typeface="Arial" panose="020B0604020202020204" pitchFamily="34" charset="0"/>
+              </a:rPr>
+              <a:t>d</a:t>
+            </a:r>
+          </a:p>
+        </p:txBody>
+      </p:sp>
+      <p:cxnSp>
+        <p:nvCxnSpPr>
+          <p:cNvPr id="102" name="Straight Connector 101">
+            <a:extLst>
+              <a:ext uri="{FF2B5EF4-FFF2-40B4-BE49-F238E27FC236}">
+                <a16:creationId xmlns:a16="http://schemas.microsoft.com/office/drawing/2014/main" id="{67E20F32-2B02-0C79-C3BB-E106EF1917AD}"/>
+              </a:ext>
+            </a:extLst>
+          </p:cNvPr>
+          <p:cNvCxnSpPr>
+            <a:cxnSpLocks/>
+          </p:cNvCxnSpPr>
+          <p:nvPr/>
+        </p:nvCxnSpPr>
+        <p:spPr>
+          <a:xfrm flipV="1">
+            <a:off x="2469259" y="694191"/>
+            <a:ext cx="6020966" cy="5448"/>
+          </a:xfrm>
+          <a:prstGeom prst="line">
+            <a:avLst/>
+          </a:prstGeom>
+          <a:ln w="19050">
+            <a:solidFill>
+              <a:srgbClr val="B57BC3"/>
+            </a:solidFill>
+          </a:ln>
+        </p:spPr>
+        <p:style>
+          <a:lnRef idx="1">
+            <a:schemeClr val="accent1"/>
+          </a:lnRef>
+          <a:fillRef idx="0">
+            <a:schemeClr val="accent1"/>
+          </a:fillRef>
+          <a:effectRef idx="0">
+            <a:schemeClr val="accent1"/>
+          </a:effectRef>
+          <a:fontRef idx="minor">
+            <a:schemeClr val="tx1"/>
+          </a:fontRef>
+        </p:style>
+      </p:cxnSp>
+      <mc:AlternateContent xmlns:mc="http://schemas.openxmlformats.org/markup-compatibility/2006">
+        <mc:Choice xmlns:p14="http://schemas.microsoft.com/office/powerpoint/2010/main" Requires="p14">
+          <p:contentPart p14:bwMode="auto" r:id="rId27">
+            <p14:nvContentPartPr>
+              <p14:cNvPr id="107" name="Ink 106">
+                <a:extLst>
+                  <a:ext uri="{FF2B5EF4-FFF2-40B4-BE49-F238E27FC236}">
+                    <a16:creationId xmlns:a16="http://schemas.microsoft.com/office/drawing/2014/main" id="{58B94F94-871B-0977-F75D-539542513FA8}"/>
+                  </a:ext>
+                </a:extLst>
+              </p14:cNvPr>
+              <p14:cNvContentPartPr/>
+              <p14:nvPr/>
+            </p14:nvContentPartPr>
+            <p14:xfrm>
+              <a:off x="2971510" y="3357280"/>
+              <a:ext cx="233640" cy="79560"/>
+            </p14:xfrm>
+          </p:contentPart>
+        </mc:Choice>
+        <mc:Fallback>
+          <p:pic>
+            <p:nvPicPr>
+              <p:cNvPr id="107" name="Ink 106">
+                <a:extLst>
+                  <a:ext uri="{FF2B5EF4-FFF2-40B4-BE49-F238E27FC236}">
+                    <a16:creationId xmlns:a16="http://schemas.microsoft.com/office/drawing/2014/main" id="{58B94F94-871B-0977-F75D-539542513FA8}"/>
+                  </a:ext>
+                </a:extLst>
+              </p:cNvPr>
+              <p:cNvPicPr/>
+              <p:nvPr/>
+            </p:nvPicPr>
+            <p:blipFill>
+              <a:blip r:embed="rId28"/>
+              <a:stretch>
+                <a:fillRect/>
+              </a:stretch>
+            </p:blipFill>
+            <p:spPr>
+              <a:xfrm>
+                <a:off x="2962510" y="3348280"/>
+                <a:ext cx="251280" cy="97200"/>
+              </a:xfrm>
+              <a:prstGeom prst="rect">
+                <a:avLst/>
+              </a:prstGeom>
+            </p:spPr>
+          </p:pic>
+        </mc:Fallback>
+      </mc:AlternateContent>
+      <p:sp>
+        <p:nvSpPr>
+          <p:cNvPr id="111" name="TextBox 110">
+            <a:extLst>
+              <a:ext uri="{FF2B5EF4-FFF2-40B4-BE49-F238E27FC236}">
+                <a16:creationId xmlns:a16="http://schemas.microsoft.com/office/drawing/2014/main" id="{13006986-5CB5-B4A9-D123-340D211246A6}"/>
+              </a:ext>
+            </a:extLst>
+          </p:cNvPr>
+          <p:cNvSpPr txBox="1"/>
+          <p:nvPr/>
+        </p:nvSpPr>
+        <p:spPr>
+          <a:xfrm>
+            <a:off x="5149906" y="346333"/>
+            <a:ext cx="45719" cy="477054"/>
+          </a:xfrm>
+          <a:prstGeom prst="rect">
+            <a:avLst/>
+          </a:prstGeom>
+          <a:noFill/>
+        </p:spPr>
+        <p:txBody>
+          <a:bodyPr wrap="square" rtlCol="0">
+            <a:spAutoFit/>
+          </a:bodyPr>
+          <a:lstStyle/>
+          <a:p>
+            <a:r>
+              <a:rPr lang="en-US" sz="2500" b="1" dirty="0">
+                <a:solidFill>
+                  <a:srgbClr val="B57BC3"/>
+                </a:solidFill>
+                <a:latin typeface="Bradley Hand ITC" panose="03070402050302030203" pitchFamily="66" charset="0"/>
+                <a:cs typeface="Arial" panose="020B0604020202020204" pitchFamily="34" charset="0"/>
+              </a:rPr>
+              <a:t>a</a:t>
+            </a:r>
+          </a:p>
+        </p:txBody>
+      </p:sp>
+    </p:spTree>
+    <p:extLst>
+      <p:ext uri="{BB962C8B-B14F-4D97-AF65-F5344CB8AC3E}">
+        <p14:creationId xmlns:p14="http://schemas.microsoft.com/office/powerpoint/2010/main" val="2356962618"/>
+      </p:ext>
+    </p:extLst>
+  </p:cSld>
+  <p:clrMapOvr>
+    <a:masterClrMapping/>
+  </p:clrMapOvr>
+</p:sld>
+</file>
+
+<file path=ppt/slides/slide3.xml><?xml version="1.0" encoding="utf-8"?>
+<p:sld xmlns:a="http://schemas.openxmlformats.org/drawingml/2006/main" xmlns:r="http://schemas.openxmlformats.org/officeDocument/2006/relationships" xmlns:p="http://schemas.openxmlformats.org/presentationml/2006/main">
+  <p:cSld>
+    <p:spTree>
+      <p:nvGrpSpPr>
+        <p:cNvPr id="1" name=""/>
+        <p:cNvGrpSpPr/>
+        <p:nvPr/>
+      </p:nvGrpSpPr>
+      <p:grpSpPr>
+        <a:xfrm>
+          <a:off x="0" y="0"/>
+          <a:ext cx="0" cy="0"/>
+          <a:chOff x="0" y="0"/>
+          <a:chExt cx="0" cy="0"/>
+        </a:xfrm>
+      </p:grpSpPr>
+      <p:pic>
+        <p:nvPicPr>
           <p:cNvPr id="5" name="Content Placeholder 4" descr="A close-up of a drawing of insects&#10;&#10;Description automatically generated">
             <a:extLst>
               <a:ext uri="{FF2B5EF4-FFF2-40B4-BE49-F238E27FC236}">
@@ -4002,7 +6667,7 @@
 </p:sld>
 </file>
 
-<file path=ppt/slides/slide3.xml><?xml version="1.0" encoding="utf-8"?>
+<file path=ppt/slides/slide4.xml><?xml version="1.0" encoding="utf-8"?>
 <p:sld xmlns:a="http://schemas.openxmlformats.org/drawingml/2006/main" xmlns:r="http://schemas.openxmlformats.org/officeDocument/2006/relationships" xmlns:p="http://schemas.openxmlformats.org/presentationml/2006/main">
   <p:cSld>
     <p:spTree>

</xml_diff>